<commit_message>
Add List and Form
</commit_message>
<xml_diff>
--- a/slides/React 入门.pptx
+++ b/slides/React 入门.pptx
@@ -5,7 +5,7 @@
     <p:sldMasterId id="2147483648" r:id="rId1"/>
   </p:sldMasterIdLst>
   <p:notesMasterIdLst>
-    <p:notesMasterId r:id="rId28"/>
+    <p:notesMasterId r:id="rId30"/>
   </p:notesMasterIdLst>
   <p:sldIdLst>
     <p:sldId id="256" r:id="rId2"/>
@@ -25,15 +25,17 @@
     <p:sldId id="270" r:id="rId16"/>
     <p:sldId id="271" r:id="rId17"/>
     <p:sldId id="272" r:id="rId18"/>
-    <p:sldId id="273" r:id="rId19"/>
-    <p:sldId id="274" r:id="rId20"/>
-    <p:sldId id="275" r:id="rId21"/>
-    <p:sldId id="276" r:id="rId22"/>
-    <p:sldId id="277" r:id="rId23"/>
-    <p:sldId id="278" r:id="rId24"/>
-    <p:sldId id="279" r:id="rId25"/>
-    <p:sldId id="280" r:id="rId26"/>
-    <p:sldId id="281" r:id="rId27"/>
+    <p:sldId id="282" r:id="rId19"/>
+    <p:sldId id="283" r:id="rId20"/>
+    <p:sldId id="273" r:id="rId21"/>
+    <p:sldId id="274" r:id="rId22"/>
+    <p:sldId id="275" r:id="rId23"/>
+    <p:sldId id="276" r:id="rId24"/>
+    <p:sldId id="277" r:id="rId25"/>
+    <p:sldId id="278" r:id="rId26"/>
+    <p:sldId id="279" r:id="rId27"/>
+    <p:sldId id="280" r:id="rId28"/>
+    <p:sldId id="281" r:id="rId29"/>
   </p:sldIdLst>
   <p:sldSz cx="12192000" cy="6858000"/>
   <p:notesSz cx="6858000" cy="9144000"/>
@@ -222,7 +224,7 @@
           <a:p>
             <a:fld id="{C7EA81BB-58F1-4FB5-8B9E-97CA0D987065}" type="datetimeFigureOut">
               <a:rPr lang="zh-CN" altLang="en-US" smtClean="0"/>
-              <a:t>2018/11/3</a:t>
+              <a:t>2018/11/4</a:t>
             </a:fld>
             <a:endParaRPr lang="zh-CN" altLang="en-US"/>
           </a:p>
@@ -747,6 +749,102 @@
           <a:lstStyle/>
           <a:p>
             <a:r>
+              <a:rPr lang="en-US" altLang="zh-CN" dirty="0" smtClean="0"/>
+              <a:t>React </a:t>
+            </a:r>
+            <a:r>
+              <a:rPr lang="zh-CN" altLang="en-US" dirty="0" smtClean="0"/>
+              <a:t>负责渲染表单的</a:t>
+            </a:r>
+            <a:r>
+              <a:rPr lang="zh-CN" altLang="en-US" smtClean="0"/>
+              <a:t>组件同时控制数据的变化</a:t>
+            </a:r>
+            <a:endParaRPr lang="zh-CN" altLang="en-US" dirty="0"/>
+          </a:p>
+        </p:txBody>
+      </p:sp>
+      <p:sp>
+        <p:nvSpPr>
+          <p:cNvPr id="4" name="灯片编号占位符 3"/>
+          <p:cNvSpPr>
+            <a:spLocks noGrp="1"/>
+          </p:cNvSpPr>
+          <p:nvPr>
+            <p:ph type="sldNum" sz="quarter" idx="10"/>
+          </p:nvPr>
+        </p:nvSpPr>
+        <p:spPr/>
+        <p:txBody>
+          <a:bodyPr/>
+          <a:lstStyle/>
+          <a:p>
+            <a:fld id="{933F5AFF-D81E-4C08-8F4D-34ABD7A65093}" type="slidenum">
+              <a:rPr lang="zh-CN" altLang="en-US" smtClean="0"/>
+              <a:t>19</a:t>
+            </a:fld>
+            <a:endParaRPr lang="zh-CN" altLang="en-US"/>
+          </a:p>
+        </p:txBody>
+      </p:sp>
+    </p:spTree>
+    <p:extLst>
+      <p:ext uri="{BB962C8B-B14F-4D97-AF65-F5344CB8AC3E}">
+        <p14:creationId xmlns:p14="http://schemas.microsoft.com/office/powerpoint/2010/main" val="2951329283"/>
+      </p:ext>
+    </p:extLst>
+  </p:cSld>
+  <p:clrMapOvr>
+    <a:masterClrMapping/>
+  </p:clrMapOvr>
+</p:notes>
+</file>
+
+<file path=ppt/notesSlides/notesSlide12.xml><?xml version="1.0" encoding="utf-8"?>
+<p:notes xmlns:a="http://schemas.openxmlformats.org/drawingml/2006/main" xmlns:r="http://schemas.openxmlformats.org/officeDocument/2006/relationships" xmlns:p="http://schemas.openxmlformats.org/presentationml/2006/main">
+  <p:cSld>
+    <p:spTree>
+      <p:nvGrpSpPr>
+        <p:cNvPr id="1" name=""/>
+        <p:cNvGrpSpPr/>
+        <p:nvPr/>
+      </p:nvGrpSpPr>
+      <p:grpSpPr>
+        <a:xfrm>
+          <a:off x="0" y="0"/>
+          <a:ext cx="0" cy="0"/>
+          <a:chOff x="0" y="0"/>
+          <a:chExt cx="0" cy="0"/>
+        </a:xfrm>
+      </p:grpSpPr>
+      <p:sp>
+        <p:nvSpPr>
+          <p:cNvPr id="2" name="幻灯片图像占位符 1"/>
+          <p:cNvSpPr>
+            <a:spLocks noGrp="1" noRot="1" noChangeAspect="1"/>
+          </p:cNvSpPr>
+          <p:nvPr>
+            <p:ph type="sldImg"/>
+          </p:nvPr>
+        </p:nvSpPr>
+        <p:spPr/>
+      </p:sp>
+      <p:sp>
+        <p:nvSpPr>
+          <p:cNvPr id="3" name="备注占位符 2"/>
+          <p:cNvSpPr>
+            <a:spLocks noGrp="1"/>
+          </p:cNvSpPr>
+          <p:nvPr>
+            <p:ph type="body" idx="1"/>
+          </p:nvPr>
+        </p:nvSpPr>
+        <p:spPr/>
+        <p:txBody>
+          <a:bodyPr/>
+          <a:lstStyle/>
+          <a:p>
+            <a:r>
               <a:rPr lang="en-US" altLang="zh-CN" dirty="0" err="1" smtClean="0"/>
               <a:t>Vue</a:t>
             </a:r>
@@ -803,7 +901,7 @@
           <a:p>
             <a:fld id="{933F5AFF-D81E-4C08-8F4D-34ABD7A65093}" type="slidenum">
               <a:rPr lang="zh-CN" altLang="en-US" smtClean="0"/>
-              <a:t>24</a:t>
+              <a:t>26</a:t>
             </a:fld>
             <a:endParaRPr lang="zh-CN" altLang="en-US"/>
           </a:p>
@@ -2236,7 +2334,7 @@
           <a:p>
             <a:fld id="{526B8B47-29F2-4AB1-95E5-A1E1ABC128C6}" type="datetimeFigureOut">
               <a:rPr lang="zh-CN" altLang="en-US" smtClean="0"/>
-              <a:t>2018/11/3</a:t>
+              <a:t>2018/11/4</a:t>
             </a:fld>
             <a:endParaRPr lang="zh-CN" altLang="en-US"/>
           </a:p>
@@ -2406,7 +2504,7 @@
           <a:p>
             <a:fld id="{526B8B47-29F2-4AB1-95E5-A1E1ABC128C6}" type="datetimeFigureOut">
               <a:rPr lang="zh-CN" altLang="en-US" smtClean="0"/>
-              <a:t>2018/11/3</a:t>
+              <a:t>2018/11/4</a:t>
             </a:fld>
             <a:endParaRPr lang="zh-CN" altLang="en-US"/>
           </a:p>
@@ -2586,7 +2684,7 @@
           <a:p>
             <a:fld id="{526B8B47-29F2-4AB1-95E5-A1E1ABC128C6}" type="datetimeFigureOut">
               <a:rPr lang="zh-CN" altLang="en-US" smtClean="0"/>
-              <a:t>2018/11/3</a:t>
+              <a:t>2018/11/4</a:t>
             </a:fld>
             <a:endParaRPr lang="zh-CN" altLang="en-US"/>
           </a:p>
@@ -2756,7 +2854,7 @@
           <a:p>
             <a:fld id="{526B8B47-29F2-4AB1-95E5-A1E1ABC128C6}" type="datetimeFigureOut">
               <a:rPr lang="zh-CN" altLang="en-US" smtClean="0"/>
-              <a:t>2018/11/3</a:t>
+              <a:t>2018/11/4</a:t>
             </a:fld>
             <a:endParaRPr lang="zh-CN" altLang="en-US"/>
           </a:p>
@@ -3002,7 +3100,7 @@
           <a:p>
             <a:fld id="{526B8B47-29F2-4AB1-95E5-A1E1ABC128C6}" type="datetimeFigureOut">
               <a:rPr lang="zh-CN" altLang="en-US" smtClean="0"/>
-              <a:t>2018/11/3</a:t>
+              <a:t>2018/11/4</a:t>
             </a:fld>
             <a:endParaRPr lang="zh-CN" altLang="en-US"/>
           </a:p>
@@ -3234,7 +3332,7 @@
           <a:p>
             <a:fld id="{526B8B47-29F2-4AB1-95E5-A1E1ABC128C6}" type="datetimeFigureOut">
               <a:rPr lang="zh-CN" altLang="en-US" smtClean="0"/>
-              <a:t>2018/11/3</a:t>
+              <a:t>2018/11/4</a:t>
             </a:fld>
             <a:endParaRPr lang="zh-CN" altLang="en-US"/>
           </a:p>
@@ -3601,7 +3699,7 @@
           <a:p>
             <a:fld id="{526B8B47-29F2-4AB1-95E5-A1E1ABC128C6}" type="datetimeFigureOut">
               <a:rPr lang="zh-CN" altLang="en-US" smtClean="0"/>
-              <a:t>2018/11/3</a:t>
+              <a:t>2018/11/4</a:t>
             </a:fld>
             <a:endParaRPr lang="zh-CN" altLang="en-US"/>
           </a:p>
@@ -3719,7 +3817,7 @@
           <a:p>
             <a:fld id="{526B8B47-29F2-4AB1-95E5-A1E1ABC128C6}" type="datetimeFigureOut">
               <a:rPr lang="zh-CN" altLang="en-US" smtClean="0"/>
-              <a:t>2018/11/3</a:t>
+              <a:t>2018/11/4</a:t>
             </a:fld>
             <a:endParaRPr lang="zh-CN" altLang="en-US"/>
           </a:p>
@@ -3814,7 +3912,7 @@
           <a:p>
             <a:fld id="{526B8B47-29F2-4AB1-95E5-A1E1ABC128C6}" type="datetimeFigureOut">
               <a:rPr lang="zh-CN" altLang="en-US" smtClean="0"/>
-              <a:t>2018/11/3</a:t>
+              <a:t>2018/11/4</a:t>
             </a:fld>
             <a:endParaRPr lang="zh-CN" altLang="en-US"/>
           </a:p>
@@ -4091,7 +4189,7 @@
           <a:p>
             <a:fld id="{526B8B47-29F2-4AB1-95E5-A1E1ABC128C6}" type="datetimeFigureOut">
               <a:rPr lang="zh-CN" altLang="en-US" smtClean="0"/>
-              <a:t>2018/11/3</a:t>
+              <a:t>2018/11/4</a:t>
             </a:fld>
             <a:endParaRPr lang="zh-CN" altLang="en-US"/>
           </a:p>
@@ -4344,7 +4442,7 @@
           <a:p>
             <a:fld id="{526B8B47-29F2-4AB1-95E5-A1E1ABC128C6}" type="datetimeFigureOut">
               <a:rPr lang="zh-CN" altLang="en-US" smtClean="0"/>
-              <a:t>2018/11/3</a:t>
+              <a:t>2018/11/4</a:t>
             </a:fld>
             <a:endParaRPr lang="zh-CN" altLang="en-US"/>
           </a:p>
@@ -4557,7 +4655,7 @@
           <a:p>
             <a:fld id="{526B8B47-29F2-4AB1-95E5-A1E1ABC128C6}" type="datetimeFigureOut">
               <a:rPr lang="zh-CN" altLang="en-US" smtClean="0"/>
-              <a:t>2018/11/3</a:t>
+              <a:t>2018/11/4</a:t>
             </a:fld>
             <a:endParaRPr lang="zh-CN" altLang="en-US"/>
           </a:p>
@@ -7978,8 +8076,16 @@
           <a:lstStyle/>
           <a:p>
             <a:r>
+              <a:rPr lang="en-US" altLang="zh-CN" dirty="0" smtClean="0"/>
+              <a:t>2.6 </a:t>
+            </a:r>
+            <a:r>
               <a:rPr lang="zh-CN" altLang="en-US" dirty="0" smtClean="0"/>
-              <a:t>主要内容</a:t>
+              <a:t>列表和 </a:t>
+            </a:r>
+            <a:r>
+              <a:rPr lang="en-US" altLang="zh-CN" dirty="0" smtClean="0"/>
+              <a:t>key </a:t>
             </a:r>
             <a:endParaRPr lang="zh-CN" altLang="en-US" dirty="0"/>
           </a:p>
@@ -8002,74 +8108,70 @@
           <a:p>
             <a:r>
               <a:rPr lang="en-US" altLang="zh-CN" dirty="0" smtClean="0"/>
-              <a:t>1. </a:t>
+              <a:t>JSX </a:t>
             </a:r>
             <a:r>
               <a:rPr lang="zh-CN" altLang="en-US" dirty="0" smtClean="0"/>
-              <a:t>关于 </a:t>
+              <a:t>中可以使用 </a:t>
+            </a:r>
+            <a:r>
+              <a:rPr lang="en-US" altLang="zh-CN" dirty="0" smtClean="0">
+                <a:latin typeface="Consolas" panose="020B0609020204030204" pitchFamily="49" charset="0"/>
+              </a:rPr>
+              <a:t>map</a:t>
             </a:r>
             <a:r>
               <a:rPr lang="en-US" altLang="zh-CN" dirty="0" smtClean="0"/>
-              <a:t>React</a:t>
-            </a:r>
-          </a:p>
-          <a:p>
-            <a:pPr marL="0" indent="0">
-              <a:buNone/>
-            </a:pPr>
+              <a:t> </a:t>
+            </a:r>
+            <a:r>
+              <a:rPr lang="zh-CN" altLang="en-US" dirty="0"/>
+              <a:t>函</a:t>
+            </a:r>
+            <a:r>
+              <a:rPr lang="zh-CN" altLang="en-US" dirty="0" smtClean="0"/>
+              <a:t>数将数组渲染为列表</a:t>
+            </a:r>
             <a:endParaRPr lang="en-US" altLang="zh-CN" dirty="0" smtClean="0"/>
           </a:p>
           <a:p>
+            <a:endParaRPr lang="en-US" altLang="zh-CN" dirty="0"/>
+          </a:p>
+          <a:p>
+            <a:r>
+              <a:rPr lang="zh-CN" altLang="en-US" dirty="0" smtClean="0"/>
+              <a:t>为列表中每一项指定 </a:t>
+            </a:r>
             <a:r>
               <a:rPr lang="en-US" altLang="zh-CN" dirty="0" smtClean="0"/>
-              <a:t>2. React </a:t>
+              <a:t>key </a:t>
             </a:r>
             <a:r>
               <a:rPr lang="zh-CN" altLang="en-US" dirty="0" smtClean="0"/>
-              <a:t>语法简介</a:t>
-            </a:r>
-            <a:endParaRPr lang="en-US" altLang="zh-CN" dirty="0" smtClean="0"/>
-          </a:p>
-          <a:p>
-            <a:endParaRPr lang="en-US" altLang="zh-CN" dirty="0" smtClean="0"/>
-          </a:p>
-          <a:p>
-            <a:r>
-              <a:rPr lang="en-US" altLang="zh-CN" sz="4000" dirty="0">
-                <a:solidFill>
-                  <a:schemeClr val="accent5"/>
-                </a:solidFill>
-              </a:rPr>
-              <a:t>3. </a:t>
-            </a:r>
-            <a:r>
-              <a:rPr lang="zh-CN" altLang="en-US" sz="4000" dirty="0">
-                <a:solidFill>
-                  <a:schemeClr val="accent5"/>
-                </a:solidFill>
-              </a:rPr>
-              <a:t>相关技术</a:t>
-            </a:r>
+              <a:t>便于 </a:t>
+            </a:r>
+            <a:r>
+              <a:rPr lang="en-US" altLang="zh-CN" dirty="0" smtClean="0"/>
+              <a:t>React </a:t>
+            </a:r>
+            <a:r>
+              <a:rPr lang="zh-CN" altLang="en-US" dirty="0" smtClean="0"/>
+              <a:t>进行优化</a:t>
+            </a:r>
+            <a:endParaRPr lang="zh-CN" altLang="en-US" dirty="0"/>
           </a:p>
         </p:txBody>
       </p:sp>
     </p:spTree>
     <p:extLst>
       <p:ext uri="{BB962C8B-B14F-4D97-AF65-F5344CB8AC3E}">
-        <p14:creationId xmlns:p14="http://schemas.microsoft.com/office/powerpoint/2010/main" val="2123684887"/>
+        <p14:creationId xmlns:p14="http://schemas.microsoft.com/office/powerpoint/2010/main" val="2934084111"/>
       </p:ext>
     </p:extLst>
   </p:cSld>
   <p:clrMapOvr>
     <a:masterClrMapping/>
   </p:clrMapOvr>
-  <p:timing>
-    <p:tnLst>
-      <p:par>
-        <p:cTn id="1" dur="indefinite" restart="never" nodeType="tmRoot"/>
-      </p:par>
-    </p:tnLst>
-  </p:timing>
 </p:sld>
 </file>
 
@@ -8100,19 +8202,18 @@
             <p:ph type="title"/>
           </p:nvPr>
         </p:nvSpPr>
-        <p:spPr>
-          <a:xfrm>
-            <a:off x="838200" y="365125"/>
-            <a:ext cx="5181600" cy="1325563"/>
-          </a:xfrm>
-        </p:spPr>
+        <p:spPr/>
         <p:txBody>
           <a:bodyPr/>
           <a:lstStyle/>
           <a:p>
             <a:r>
               <a:rPr lang="en-US" altLang="zh-CN" dirty="0" smtClean="0"/>
-              <a:t>3.1 Redux </a:t>
+              <a:t>2.7 </a:t>
+            </a:r>
+            <a:r>
+              <a:rPr lang="zh-CN" altLang="en-US" dirty="0" smtClean="0"/>
+              <a:t>表单</a:t>
             </a:r>
             <a:endParaRPr lang="zh-CN" altLang="en-US" dirty="0"/>
           </a:p>
@@ -8120,488 +8221,37 @@
       </p:sp>
       <p:sp>
         <p:nvSpPr>
-          <p:cNvPr id="6" name="内容占位符 5"/>
-          <p:cNvSpPr>
-            <a:spLocks noGrp="1"/>
-          </p:cNvSpPr>
-          <p:nvPr>
-            <p:ph sz="half" idx="1"/>
-          </p:nvPr>
-        </p:nvSpPr>
-        <p:spPr>
-          <a:xfrm>
-            <a:off x="838200" y="1825625"/>
-            <a:ext cx="5181600" cy="4351338"/>
-          </a:xfrm>
-          <a:solidFill>
-            <a:schemeClr val="tx2"/>
-          </a:solidFill>
-        </p:spPr>
-        <p:txBody>
-          <a:bodyPr>
-            <a:normAutofit lnSpcReduction="10000"/>
-          </a:bodyPr>
-          <a:lstStyle/>
-          <a:p>
-            <a:pPr marL="0" indent="0">
-              <a:buNone/>
-            </a:pPr>
-            <a:r>
-              <a:rPr lang="en-US" altLang="zh-CN" dirty="0">
-                <a:solidFill>
-                  <a:schemeClr val="accent4">
-                    <a:lumMod val="60000"/>
-                    <a:lumOff val="40000"/>
-                  </a:schemeClr>
-                </a:solidFill>
-                <a:latin typeface="Consolas" panose="020B0609020204030204" pitchFamily="49" charset="0"/>
-              </a:rPr>
-              <a:t>&lt;FirstComp&gt;</a:t>
-            </a:r>
-          </a:p>
-          <a:p>
-            <a:pPr marL="0" indent="0">
-              <a:buNone/>
-            </a:pPr>
-            <a:r>
-              <a:rPr lang="en-US" altLang="zh-CN" dirty="0">
-                <a:solidFill>
-                  <a:schemeClr val="accent4">
-                    <a:lumMod val="60000"/>
-                    <a:lumOff val="40000"/>
-                  </a:schemeClr>
-                </a:solidFill>
-                <a:latin typeface="Consolas" panose="020B0609020204030204" pitchFamily="49" charset="0"/>
-              </a:rPr>
-              <a:t>  </a:t>
-            </a:r>
-            <a:r>
-              <a:rPr lang="en-US" altLang="zh-CN" dirty="0" smtClean="0">
-                <a:solidFill>
-                  <a:schemeClr val="accent4">
-                    <a:lumMod val="60000"/>
-                    <a:lumOff val="40000"/>
-                  </a:schemeClr>
-                </a:solidFill>
-                <a:latin typeface="Consolas" panose="020B0609020204030204" pitchFamily="49" charset="0"/>
-              </a:rPr>
-              <a:t>&lt;</a:t>
-            </a:r>
-            <a:r>
-              <a:rPr lang="en-US" altLang="zh-CN" dirty="0">
-                <a:solidFill>
-                  <a:schemeClr val="accent4">
-                    <a:lumMod val="60000"/>
-                    <a:lumOff val="40000"/>
-                  </a:schemeClr>
-                </a:solidFill>
-                <a:latin typeface="Consolas" panose="020B0609020204030204" pitchFamily="49" charset="0"/>
-              </a:rPr>
-              <a:t>SecondComp&gt;</a:t>
-            </a:r>
-          </a:p>
-          <a:p>
-            <a:pPr marL="0" indent="0">
-              <a:buNone/>
-            </a:pPr>
-            <a:r>
-              <a:rPr lang="en-US" altLang="zh-CN" dirty="0">
-                <a:solidFill>
-                  <a:schemeClr val="accent4">
-                    <a:lumMod val="60000"/>
-                    <a:lumOff val="40000"/>
-                  </a:schemeClr>
-                </a:solidFill>
-                <a:latin typeface="Consolas" panose="020B0609020204030204" pitchFamily="49" charset="0"/>
-              </a:rPr>
-              <a:t>    </a:t>
-            </a:r>
-            <a:r>
-              <a:rPr lang="en-US" altLang="zh-CN" dirty="0" smtClean="0">
-                <a:solidFill>
-                  <a:schemeClr val="accent4">
-                    <a:lumMod val="60000"/>
-                    <a:lumOff val="40000"/>
-                  </a:schemeClr>
-                </a:solidFill>
-                <a:latin typeface="Consolas" panose="020B0609020204030204" pitchFamily="49" charset="0"/>
-              </a:rPr>
-              <a:t>&lt;ThirdComp</a:t>
-            </a:r>
-            <a:r>
-              <a:rPr lang="en-US" altLang="zh-CN" dirty="0">
-                <a:solidFill>
-                  <a:schemeClr val="accent4">
-                    <a:lumMod val="60000"/>
-                    <a:lumOff val="40000"/>
-                  </a:schemeClr>
-                </a:solidFill>
-                <a:latin typeface="Consolas" panose="020B0609020204030204" pitchFamily="49" charset="0"/>
-              </a:rPr>
-              <a:t>&gt;</a:t>
-            </a:r>
-          </a:p>
-          <a:p>
-            <a:pPr marL="0" indent="0">
-              <a:buNone/>
-            </a:pPr>
-            <a:r>
-              <a:rPr lang="en-US" altLang="zh-CN" dirty="0">
-                <a:solidFill>
-                  <a:schemeClr val="accent4">
-                    <a:lumMod val="60000"/>
-                    <a:lumOff val="40000"/>
-                  </a:schemeClr>
-                </a:solidFill>
-                <a:latin typeface="Consolas" panose="020B0609020204030204" pitchFamily="49" charset="0"/>
-              </a:rPr>
-              <a:t>      </a:t>
-            </a:r>
-            <a:r>
-              <a:rPr lang="en-US" altLang="zh-CN" dirty="0" smtClean="0">
-                <a:solidFill>
-                  <a:schemeClr val="accent4">
-                    <a:lumMod val="60000"/>
-                    <a:lumOff val="40000"/>
-                  </a:schemeClr>
-                </a:solidFill>
-                <a:latin typeface="Consolas" panose="020B0609020204030204" pitchFamily="49" charset="0"/>
-              </a:rPr>
-              <a:t>&lt;</a:t>
-            </a:r>
-            <a:r>
-              <a:rPr lang="en-US" altLang="zh-CN" dirty="0">
-                <a:solidFill>
-                  <a:schemeClr val="accent4">
-                    <a:lumMod val="60000"/>
-                    <a:lumOff val="40000"/>
-                  </a:schemeClr>
-                </a:solidFill>
-                <a:latin typeface="Consolas" panose="020B0609020204030204" pitchFamily="49" charset="0"/>
-              </a:rPr>
-              <a:t>FourthComp&gt;</a:t>
-            </a:r>
-          </a:p>
-          <a:p>
-            <a:pPr marL="0" indent="0">
-              <a:buNone/>
-            </a:pPr>
-            <a:r>
-              <a:rPr lang="en-US" altLang="zh-CN" dirty="0">
-                <a:solidFill>
-                  <a:schemeClr val="accent4">
-                    <a:lumMod val="60000"/>
-                    <a:lumOff val="40000"/>
-                  </a:schemeClr>
-                </a:solidFill>
-                <a:latin typeface="Consolas" panose="020B0609020204030204" pitchFamily="49" charset="0"/>
-              </a:rPr>
-              <a:t>        </a:t>
-            </a:r>
-            <a:r>
-              <a:rPr lang="en-US" altLang="zh-CN" dirty="0" smtClean="0">
-                <a:solidFill>
-                  <a:schemeClr val="accent4">
-                    <a:lumMod val="60000"/>
-                    <a:lumOff val="40000"/>
-                  </a:schemeClr>
-                </a:solidFill>
-                <a:latin typeface="Consolas" panose="020B0609020204030204" pitchFamily="49" charset="0"/>
-              </a:rPr>
-              <a:t>&lt;</a:t>
-            </a:r>
-            <a:r>
-              <a:rPr lang="en-US" altLang="zh-CN" dirty="0">
-                <a:solidFill>
-                  <a:schemeClr val="accent4">
-                    <a:lumMod val="60000"/>
-                    <a:lumOff val="40000"/>
-                  </a:schemeClr>
-                </a:solidFill>
-                <a:latin typeface="Consolas" panose="020B0609020204030204" pitchFamily="49" charset="0"/>
-              </a:rPr>
-              <a:t>TargetComp /&gt;</a:t>
-            </a:r>
-          </a:p>
-          <a:p>
-            <a:pPr marL="0" indent="0">
-              <a:buNone/>
-            </a:pPr>
-            <a:r>
-              <a:rPr lang="en-US" altLang="zh-CN" dirty="0">
-                <a:solidFill>
-                  <a:schemeClr val="accent4">
-                    <a:lumMod val="60000"/>
-                    <a:lumOff val="40000"/>
-                  </a:schemeClr>
-                </a:solidFill>
-                <a:latin typeface="Consolas" panose="020B0609020204030204" pitchFamily="49" charset="0"/>
-              </a:rPr>
-              <a:t>      </a:t>
-            </a:r>
-            <a:r>
-              <a:rPr lang="en-US" altLang="zh-CN" dirty="0" smtClean="0">
-                <a:solidFill>
-                  <a:schemeClr val="accent4">
-                    <a:lumMod val="60000"/>
-                    <a:lumOff val="40000"/>
-                  </a:schemeClr>
-                </a:solidFill>
-                <a:latin typeface="Consolas" panose="020B0609020204030204" pitchFamily="49" charset="0"/>
-              </a:rPr>
-              <a:t>&lt;/</a:t>
-            </a:r>
-            <a:r>
-              <a:rPr lang="en-US" altLang="zh-CN" dirty="0">
-                <a:solidFill>
-                  <a:schemeClr val="accent4">
-                    <a:lumMod val="60000"/>
-                    <a:lumOff val="40000"/>
-                  </a:schemeClr>
-                </a:solidFill>
-                <a:latin typeface="Consolas" panose="020B0609020204030204" pitchFamily="49" charset="0"/>
-              </a:rPr>
-              <a:t>FourthComp&gt;</a:t>
-            </a:r>
-          </a:p>
-          <a:p>
-            <a:pPr marL="0" indent="0">
-              <a:buNone/>
-            </a:pPr>
-            <a:r>
-              <a:rPr lang="en-US" altLang="zh-CN" dirty="0">
-                <a:solidFill>
-                  <a:schemeClr val="accent4">
-                    <a:lumMod val="60000"/>
-                    <a:lumOff val="40000"/>
-                  </a:schemeClr>
-                </a:solidFill>
-                <a:latin typeface="Consolas" panose="020B0609020204030204" pitchFamily="49" charset="0"/>
-              </a:rPr>
-              <a:t>    </a:t>
-            </a:r>
-            <a:r>
-              <a:rPr lang="en-US" altLang="zh-CN" dirty="0" smtClean="0">
-                <a:solidFill>
-                  <a:schemeClr val="accent4">
-                    <a:lumMod val="60000"/>
-                    <a:lumOff val="40000"/>
-                  </a:schemeClr>
-                </a:solidFill>
-                <a:latin typeface="Consolas" panose="020B0609020204030204" pitchFamily="49" charset="0"/>
-              </a:rPr>
-              <a:t>&lt;/</a:t>
-            </a:r>
-            <a:r>
-              <a:rPr lang="en-US" altLang="zh-CN" dirty="0">
-                <a:solidFill>
-                  <a:schemeClr val="accent4">
-                    <a:lumMod val="60000"/>
-                    <a:lumOff val="40000"/>
-                  </a:schemeClr>
-                </a:solidFill>
-                <a:latin typeface="Consolas" panose="020B0609020204030204" pitchFamily="49" charset="0"/>
-              </a:rPr>
-              <a:t>ThirdComp&gt;</a:t>
-            </a:r>
-          </a:p>
-          <a:p>
-            <a:pPr marL="0" indent="0">
-              <a:buNone/>
-            </a:pPr>
-            <a:r>
-              <a:rPr lang="en-US" altLang="zh-CN" dirty="0">
-                <a:solidFill>
-                  <a:schemeClr val="accent4">
-                    <a:lumMod val="60000"/>
-                    <a:lumOff val="40000"/>
-                  </a:schemeClr>
-                </a:solidFill>
-                <a:latin typeface="Consolas" panose="020B0609020204030204" pitchFamily="49" charset="0"/>
-              </a:rPr>
-              <a:t>  </a:t>
-            </a:r>
-            <a:r>
-              <a:rPr lang="en-US" altLang="zh-CN" dirty="0" smtClean="0">
-                <a:solidFill>
-                  <a:schemeClr val="accent4">
-                    <a:lumMod val="60000"/>
-                    <a:lumOff val="40000"/>
-                  </a:schemeClr>
-                </a:solidFill>
-                <a:latin typeface="Consolas" panose="020B0609020204030204" pitchFamily="49" charset="0"/>
-              </a:rPr>
-              <a:t>&lt;/</a:t>
-            </a:r>
-            <a:r>
-              <a:rPr lang="en-US" altLang="zh-CN" dirty="0">
-                <a:solidFill>
-                  <a:schemeClr val="accent4">
-                    <a:lumMod val="60000"/>
-                    <a:lumOff val="40000"/>
-                  </a:schemeClr>
-                </a:solidFill>
-                <a:latin typeface="Consolas" panose="020B0609020204030204" pitchFamily="49" charset="0"/>
-              </a:rPr>
-              <a:t>SecondComp&gt;</a:t>
-            </a:r>
-          </a:p>
-          <a:p>
-            <a:pPr marL="0" indent="0">
-              <a:buNone/>
-            </a:pPr>
-            <a:r>
-              <a:rPr lang="en-US" altLang="zh-CN" dirty="0" smtClean="0">
-                <a:solidFill>
-                  <a:schemeClr val="accent4">
-                    <a:lumMod val="60000"/>
-                    <a:lumOff val="40000"/>
-                  </a:schemeClr>
-                </a:solidFill>
-                <a:latin typeface="Consolas" panose="020B0609020204030204" pitchFamily="49" charset="0"/>
-              </a:rPr>
-              <a:t>&lt;/</a:t>
-            </a:r>
-            <a:r>
-              <a:rPr lang="en-US" altLang="zh-CN" dirty="0">
-                <a:solidFill>
-                  <a:schemeClr val="accent4">
-                    <a:lumMod val="60000"/>
-                    <a:lumOff val="40000"/>
-                  </a:schemeClr>
-                </a:solidFill>
-                <a:latin typeface="Consolas" panose="020B0609020204030204" pitchFamily="49" charset="0"/>
-              </a:rPr>
-              <a:t>FirstComp&gt;</a:t>
-            </a:r>
-            <a:endParaRPr lang="zh-CN" altLang="en-US" dirty="0">
-              <a:solidFill>
-                <a:schemeClr val="accent4">
-                  <a:lumMod val="60000"/>
-                  <a:lumOff val="40000"/>
-                </a:schemeClr>
-              </a:solidFill>
-              <a:latin typeface="Consolas" panose="020B0609020204030204" pitchFamily="49" charset="0"/>
-            </a:endParaRPr>
-          </a:p>
-        </p:txBody>
-      </p:sp>
-      <p:pic>
-        <p:nvPicPr>
-          <p:cNvPr id="8" name="内容占位符 7"/>
-          <p:cNvPicPr>
-            <a:picLocks noGrp="1" noChangeAspect="1"/>
-          </p:cNvPicPr>
-          <p:nvPr>
-            <p:ph sz="half" idx="2"/>
-          </p:nvPr>
-        </p:nvPicPr>
-        <p:blipFill>
-          <a:blip r:embed="rId2">
-            <a:extLst>
-              <a:ext uri="{28A0092B-C50C-407E-A947-70E740481C1C}">
-                <a14:useLocalDpi xmlns:a14="http://schemas.microsoft.com/office/drawing/2010/main" val="0"/>
-              </a:ext>
-            </a:extLst>
-          </a:blip>
-          <a:stretch>
-            <a:fillRect/>
-          </a:stretch>
-        </p:blipFill>
-        <p:spPr>
-          <a:xfrm>
-            <a:off x="6243637" y="373063"/>
-            <a:ext cx="4875213" cy="1317625"/>
-          </a:xfrm>
-        </p:spPr>
-      </p:pic>
-      <p:sp>
-        <p:nvSpPr>
-          <p:cNvPr id="5" name="文本框 4"/>
-          <p:cNvSpPr txBox="1"/>
-          <p:nvPr/>
-        </p:nvSpPr>
-        <p:spPr>
-          <a:xfrm>
-            <a:off x="6243637" y="1825625"/>
-            <a:ext cx="4875213" cy="2092881"/>
-          </a:xfrm>
-          <a:prstGeom prst="rect">
-            <a:avLst/>
-          </a:prstGeom>
-          <a:noFill/>
-        </p:spPr>
-        <p:txBody>
-          <a:bodyPr wrap="square" rtlCol="0">
-            <a:spAutoFit/>
-          </a:bodyPr>
-          <a:lstStyle/>
-          <a:p>
-            <a:r>
-              <a:rPr lang="zh-CN" altLang="en-US" sz="2600" dirty="0" smtClean="0"/>
-              <a:t>如果 </a:t>
-            </a:r>
-            <a:r>
-              <a:rPr lang="en-US" altLang="zh-CN" sz="2600" dirty="0" smtClean="0"/>
-              <a:t>&lt;TargetComp /&gt; </a:t>
-            </a:r>
-            <a:r>
-              <a:rPr lang="zh-CN" altLang="en-US" sz="2600" dirty="0" smtClean="0"/>
-              <a:t>需要用到一个来自 </a:t>
-            </a:r>
-            <a:r>
-              <a:rPr lang="en-US" altLang="zh-CN" sz="2600" dirty="0" smtClean="0"/>
-              <a:t>&lt;FirstComp /&gt; </a:t>
-            </a:r>
-            <a:r>
-              <a:rPr lang="zh-CN" altLang="en-US" sz="2600" dirty="0" smtClean="0"/>
-              <a:t>的数据，需要以 </a:t>
-            </a:r>
-            <a:r>
-              <a:rPr lang="en-US" altLang="zh-CN" sz="2600" dirty="0" smtClean="0"/>
-              <a:t>props </a:t>
-            </a:r>
-            <a:r>
-              <a:rPr lang="zh-CN" altLang="en-US" sz="2600" dirty="0" smtClean="0"/>
-              <a:t>的方式将该数据传递 </a:t>
-            </a:r>
-            <a:r>
-              <a:rPr lang="en-US" altLang="zh-CN" sz="2600" dirty="0" smtClean="0"/>
-              <a:t>4 </a:t>
-            </a:r>
-            <a:r>
-              <a:rPr lang="zh-CN" altLang="en-US" sz="2600" dirty="0" smtClean="0"/>
-              <a:t>层，然而这个数据对于中间</a:t>
-            </a:r>
-            <a:r>
-              <a:rPr lang="en-US" altLang="zh-CN" sz="2600" dirty="0" smtClean="0"/>
-              <a:t>3 </a:t>
-            </a:r>
-            <a:r>
-              <a:rPr lang="zh-CN" altLang="en-US" sz="2600" dirty="0" smtClean="0"/>
-              <a:t>个组件来说是没有用的</a:t>
-            </a:r>
-            <a:endParaRPr lang="zh-CN" altLang="en-US" sz="2600" dirty="0"/>
+          <p:cNvPr id="3" name="内容占位符 2"/>
+          <p:cNvSpPr>
+            <a:spLocks noGrp="1"/>
+          </p:cNvSpPr>
+          <p:nvPr>
+            <p:ph idx="1"/>
+          </p:nvPr>
+        </p:nvSpPr>
+        <p:spPr/>
+        <p:txBody>
+          <a:bodyPr/>
+          <a:lstStyle/>
+          <a:p>
+            <a:r>
+              <a:rPr lang="zh-CN" altLang="en-US" dirty="0" smtClean="0"/>
+              <a:t>受控组件</a:t>
+            </a:r>
+            <a:endParaRPr lang="zh-CN" altLang="en-US" dirty="0"/>
           </a:p>
         </p:txBody>
       </p:sp>
     </p:spTree>
     <p:extLst>
       <p:ext uri="{BB962C8B-B14F-4D97-AF65-F5344CB8AC3E}">
-        <p14:creationId xmlns:p14="http://schemas.microsoft.com/office/powerpoint/2010/main" val="1012171988"/>
+        <p14:creationId xmlns:p14="http://schemas.microsoft.com/office/powerpoint/2010/main" val="3755326394"/>
       </p:ext>
     </p:extLst>
   </p:cSld>
   <p:clrMapOvr>
     <a:masterClrMapping/>
   </p:clrMapOvr>
-  <p:timing>
-    <p:tnLst>
-      <p:par>
-        <p:cTn id="1" dur="indefinite" restart="never" nodeType="tmRoot"/>
-      </p:par>
-    </p:tnLst>
-  </p:timing>
 </p:sld>
 </file>
 
@@ -8753,498 +8403,91 @@
             <p:ph type="title"/>
           </p:nvPr>
         </p:nvSpPr>
-        <p:spPr>
-          <a:xfrm>
-            <a:off x="838200" y="365125"/>
-            <a:ext cx="5181600" cy="1325563"/>
-          </a:xfrm>
-        </p:spPr>
+        <p:spPr/>
         <p:txBody>
           <a:bodyPr/>
           <a:lstStyle/>
           <a:p>
             <a:r>
+              <a:rPr lang="zh-CN" altLang="en-US" dirty="0" smtClean="0"/>
+              <a:t>主要内容</a:t>
+            </a:r>
+            <a:endParaRPr lang="zh-CN" altLang="en-US" dirty="0"/>
+          </a:p>
+        </p:txBody>
+      </p:sp>
+      <p:sp>
+        <p:nvSpPr>
+          <p:cNvPr id="3" name="内容占位符 2"/>
+          <p:cNvSpPr>
+            <a:spLocks noGrp="1"/>
+          </p:cNvSpPr>
+          <p:nvPr>
+            <p:ph idx="1"/>
+          </p:nvPr>
+        </p:nvSpPr>
+        <p:spPr/>
+        <p:txBody>
+          <a:bodyPr/>
+          <a:lstStyle/>
+          <a:p>
+            <a:r>
               <a:rPr lang="en-US" altLang="zh-CN" dirty="0" smtClean="0"/>
-              <a:t>3.1 Redux </a:t>
-            </a:r>
-            <a:endParaRPr lang="zh-CN" altLang="en-US" dirty="0"/>
-          </a:p>
-        </p:txBody>
-      </p:sp>
-      <p:sp>
-        <p:nvSpPr>
-          <p:cNvPr id="6" name="内容占位符 5"/>
-          <p:cNvSpPr>
-            <a:spLocks noGrp="1"/>
-          </p:cNvSpPr>
-          <p:nvPr>
-            <p:ph sz="half" idx="1"/>
-          </p:nvPr>
-        </p:nvSpPr>
-        <p:spPr>
-          <a:xfrm>
-            <a:off x="838200" y="1825625"/>
-            <a:ext cx="5181600" cy="4351338"/>
-          </a:xfrm>
-          <a:solidFill>
-            <a:schemeClr val="tx2"/>
-          </a:solidFill>
-        </p:spPr>
-        <p:txBody>
-          <a:bodyPr>
-            <a:normAutofit fontScale="77500" lnSpcReduction="20000"/>
-          </a:bodyPr>
-          <a:lstStyle/>
+              <a:t>1. </a:t>
+            </a:r>
+            <a:r>
+              <a:rPr lang="zh-CN" altLang="en-US" dirty="0" smtClean="0"/>
+              <a:t>关于 </a:t>
+            </a:r>
+            <a:r>
+              <a:rPr lang="en-US" altLang="zh-CN" dirty="0" smtClean="0"/>
+              <a:t>React</a:t>
+            </a:r>
+          </a:p>
           <a:p>
             <a:pPr marL="0" indent="0">
               <a:buNone/>
             </a:pPr>
-            <a:r>
-              <a:rPr lang="en-US" altLang="zh-CN" dirty="0" smtClean="0">
-                <a:solidFill>
-                  <a:schemeClr val="accent4">
-                    <a:lumMod val="60000"/>
-                    <a:lumOff val="40000"/>
-                  </a:schemeClr>
-                </a:solidFill>
-                <a:latin typeface="Consolas" panose="020B0609020204030204" pitchFamily="49" charset="0"/>
-              </a:rPr>
-              <a:t>&lt;</a:t>
-            </a:r>
-            <a:r>
-              <a:rPr lang="en-US" altLang="zh-CN" dirty="0">
-                <a:solidFill>
-                  <a:schemeClr val="accent4">
-                    <a:lumMod val="60000"/>
-                    <a:lumOff val="40000"/>
-                  </a:schemeClr>
-                </a:solidFill>
-                <a:latin typeface="Consolas" panose="020B0609020204030204" pitchFamily="49" charset="0"/>
-              </a:rPr>
-              <a:t>Comp1&gt;</a:t>
-            </a:r>
-          </a:p>
-          <a:p>
-            <a:pPr marL="0" indent="0">
-              <a:buNone/>
-            </a:pPr>
-            <a:r>
-              <a:rPr lang="en-US" altLang="zh-CN" dirty="0" smtClean="0">
-                <a:solidFill>
-                  <a:schemeClr val="accent4">
-                    <a:lumMod val="60000"/>
-                    <a:lumOff val="40000"/>
-                  </a:schemeClr>
-                </a:solidFill>
-                <a:latin typeface="Consolas" panose="020B0609020204030204" pitchFamily="49" charset="0"/>
-              </a:rPr>
-              <a:t>  &lt;</a:t>
-            </a:r>
-            <a:r>
-              <a:rPr lang="en-US" altLang="zh-CN" dirty="0">
-                <a:solidFill>
-                  <a:schemeClr val="accent4">
-                    <a:lumMod val="60000"/>
-                    <a:lumOff val="40000"/>
-                  </a:schemeClr>
-                </a:solidFill>
-                <a:latin typeface="Consolas" panose="020B0609020204030204" pitchFamily="49" charset="0"/>
-              </a:rPr>
-              <a:t>Comp2&gt;</a:t>
-            </a:r>
-          </a:p>
-          <a:p>
-            <a:pPr marL="0" indent="0">
-              <a:buNone/>
-            </a:pPr>
-            <a:r>
-              <a:rPr lang="en-US" altLang="zh-CN" dirty="0" smtClean="0">
-                <a:solidFill>
-                  <a:schemeClr val="accent4">
-                    <a:lumMod val="60000"/>
-                    <a:lumOff val="40000"/>
-                  </a:schemeClr>
-                </a:solidFill>
-                <a:latin typeface="Consolas" panose="020B0609020204030204" pitchFamily="49" charset="0"/>
-              </a:rPr>
-              <a:t>    </a:t>
-            </a:r>
-            <a:r>
-              <a:rPr lang="en-US" altLang="zh-CN" dirty="0">
-                <a:solidFill>
-                  <a:schemeClr val="accent6">
-                    <a:lumMod val="60000"/>
-                    <a:lumOff val="40000"/>
-                  </a:schemeClr>
-                </a:solidFill>
-                <a:latin typeface="Consolas" panose="020B0609020204030204" pitchFamily="49" charset="0"/>
-              </a:rPr>
-              <a:t>&lt;Comp3 /&gt;</a:t>
-            </a:r>
-          </a:p>
-          <a:p>
-            <a:pPr marL="0" indent="0">
-              <a:buNone/>
-            </a:pPr>
-            <a:r>
-              <a:rPr lang="en-US" altLang="zh-CN" dirty="0" smtClean="0">
-                <a:solidFill>
-                  <a:schemeClr val="accent4">
-                    <a:lumMod val="60000"/>
-                    <a:lumOff val="40000"/>
-                  </a:schemeClr>
-                </a:solidFill>
-                <a:latin typeface="Consolas" panose="020B0609020204030204" pitchFamily="49" charset="0"/>
-              </a:rPr>
-              <a:t>  &lt;/</a:t>
-            </a:r>
-            <a:r>
-              <a:rPr lang="en-US" altLang="zh-CN" dirty="0">
-                <a:solidFill>
-                  <a:schemeClr val="accent4">
-                    <a:lumMod val="60000"/>
-                    <a:lumOff val="40000"/>
-                  </a:schemeClr>
-                </a:solidFill>
-                <a:latin typeface="Consolas" panose="020B0609020204030204" pitchFamily="49" charset="0"/>
-              </a:rPr>
-              <a:t>Comp2&gt;</a:t>
-            </a:r>
-          </a:p>
-          <a:p>
-            <a:pPr marL="0" indent="0">
-              <a:buNone/>
-            </a:pPr>
-            <a:r>
-              <a:rPr lang="en-US" altLang="zh-CN" dirty="0" smtClean="0">
-                <a:solidFill>
-                  <a:schemeClr val="accent4">
-                    <a:lumMod val="60000"/>
-                    <a:lumOff val="40000"/>
-                  </a:schemeClr>
-                </a:solidFill>
-                <a:latin typeface="Consolas" panose="020B0609020204030204" pitchFamily="49" charset="0"/>
-              </a:rPr>
-              <a:t>  </a:t>
-            </a:r>
-            <a:r>
-              <a:rPr lang="en-US" altLang="zh-CN" dirty="0">
-                <a:solidFill>
-                  <a:schemeClr val="accent6">
-                    <a:lumMod val="60000"/>
-                    <a:lumOff val="40000"/>
-                  </a:schemeClr>
-                </a:solidFill>
-                <a:latin typeface="Consolas" panose="020B0609020204030204" pitchFamily="49" charset="0"/>
-              </a:rPr>
-              <a:t>&lt;Comp4 /&gt;</a:t>
-            </a:r>
-          </a:p>
-          <a:p>
-            <a:pPr marL="0" indent="0">
-              <a:buNone/>
-            </a:pPr>
-            <a:r>
-              <a:rPr lang="en-US" altLang="zh-CN" dirty="0" smtClean="0">
-                <a:solidFill>
-                  <a:schemeClr val="accent4">
-                    <a:lumMod val="60000"/>
-                    <a:lumOff val="40000"/>
-                  </a:schemeClr>
-                </a:solidFill>
-                <a:latin typeface="Consolas" panose="020B0609020204030204" pitchFamily="49" charset="0"/>
-              </a:rPr>
-              <a:t>  </a:t>
-            </a:r>
-            <a:r>
-              <a:rPr lang="en-US" altLang="zh-CN" dirty="0">
-                <a:solidFill>
-                  <a:schemeClr val="accent4">
-                    <a:lumMod val="60000"/>
-                    <a:lumOff val="40000"/>
-                  </a:schemeClr>
-                </a:solidFill>
-                <a:latin typeface="Consolas" panose="020B0609020204030204" pitchFamily="49" charset="0"/>
-              </a:rPr>
-              <a:t>&lt;Comp5 /&gt;</a:t>
-            </a:r>
-          </a:p>
-          <a:p>
-            <a:pPr marL="0" indent="0">
-              <a:buNone/>
-            </a:pPr>
-            <a:r>
-              <a:rPr lang="en-US" altLang="zh-CN" dirty="0" smtClean="0">
-                <a:solidFill>
-                  <a:schemeClr val="accent4">
-                    <a:lumMod val="60000"/>
-                    <a:lumOff val="40000"/>
-                  </a:schemeClr>
-                </a:solidFill>
-                <a:latin typeface="Consolas" panose="020B0609020204030204" pitchFamily="49" charset="0"/>
-              </a:rPr>
-              <a:t>  &lt;</a:t>
-            </a:r>
-            <a:r>
-              <a:rPr lang="en-US" altLang="zh-CN" dirty="0">
-                <a:solidFill>
-                  <a:schemeClr val="accent4">
-                    <a:lumMod val="60000"/>
-                    <a:lumOff val="40000"/>
-                  </a:schemeClr>
-                </a:solidFill>
-                <a:latin typeface="Consolas" panose="020B0609020204030204" pitchFamily="49" charset="0"/>
-              </a:rPr>
-              <a:t>Comp6&gt;</a:t>
-            </a:r>
-          </a:p>
-          <a:p>
-            <a:pPr marL="0" indent="0">
-              <a:buNone/>
-            </a:pPr>
-            <a:r>
-              <a:rPr lang="en-US" altLang="zh-CN" dirty="0" smtClean="0">
-                <a:solidFill>
-                  <a:schemeClr val="accent4">
-                    <a:lumMod val="60000"/>
-                    <a:lumOff val="40000"/>
-                  </a:schemeClr>
-                </a:solidFill>
-                <a:latin typeface="Consolas" panose="020B0609020204030204" pitchFamily="49" charset="0"/>
-              </a:rPr>
-              <a:t>    </a:t>
-            </a:r>
-            <a:r>
-              <a:rPr lang="en-US" altLang="zh-CN" dirty="0">
-                <a:solidFill>
-                  <a:schemeClr val="accent6">
-                    <a:lumMod val="60000"/>
-                    <a:lumOff val="40000"/>
-                  </a:schemeClr>
-                </a:solidFill>
-                <a:latin typeface="Consolas" panose="020B0609020204030204" pitchFamily="49" charset="0"/>
-              </a:rPr>
-              <a:t>&lt;Comp7&gt;</a:t>
-            </a:r>
-          </a:p>
-          <a:p>
-            <a:pPr marL="0" indent="0">
-              <a:buNone/>
-            </a:pPr>
-            <a:r>
-              <a:rPr lang="en-US" altLang="zh-CN" dirty="0" smtClean="0">
-                <a:solidFill>
-                  <a:schemeClr val="accent4">
-                    <a:lumMod val="60000"/>
-                    <a:lumOff val="40000"/>
-                  </a:schemeClr>
-                </a:solidFill>
-                <a:latin typeface="Consolas" panose="020B0609020204030204" pitchFamily="49" charset="0"/>
-              </a:rPr>
-              <a:t>      </a:t>
-            </a:r>
-            <a:r>
-              <a:rPr lang="en-US" altLang="zh-CN" dirty="0">
-                <a:solidFill>
-                  <a:schemeClr val="accent6">
-                    <a:lumMod val="60000"/>
-                    <a:lumOff val="40000"/>
-                  </a:schemeClr>
-                </a:solidFill>
-                <a:latin typeface="Consolas" panose="020B0609020204030204" pitchFamily="49" charset="0"/>
-              </a:rPr>
-              <a:t>&lt;Comp8 /&gt;</a:t>
-            </a:r>
-          </a:p>
-          <a:p>
-            <a:pPr marL="0" indent="0">
-              <a:buNone/>
-            </a:pPr>
-            <a:r>
-              <a:rPr lang="en-US" altLang="zh-CN" dirty="0">
-                <a:solidFill>
-                  <a:schemeClr val="accent4">
-                    <a:lumMod val="60000"/>
-                    <a:lumOff val="40000"/>
-                  </a:schemeClr>
-                </a:solidFill>
-                <a:latin typeface="Consolas" panose="020B0609020204030204" pitchFamily="49" charset="0"/>
-              </a:rPr>
-              <a:t>    </a:t>
-            </a:r>
-            <a:r>
-              <a:rPr lang="en-US" altLang="zh-CN" dirty="0" smtClean="0">
-                <a:solidFill>
-                  <a:schemeClr val="accent4">
-                    <a:lumMod val="60000"/>
-                    <a:lumOff val="40000"/>
-                  </a:schemeClr>
-                </a:solidFill>
-                <a:latin typeface="Consolas" panose="020B0609020204030204" pitchFamily="49" charset="0"/>
-              </a:rPr>
-              <a:t>&lt;/</a:t>
-            </a:r>
-            <a:r>
-              <a:rPr lang="en-US" altLang="zh-CN" dirty="0">
-                <a:solidFill>
-                  <a:schemeClr val="accent4">
-                    <a:lumMod val="60000"/>
-                    <a:lumOff val="40000"/>
-                  </a:schemeClr>
-                </a:solidFill>
-                <a:latin typeface="Consolas" panose="020B0609020204030204" pitchFamily="49" charset="0"/>
-              </a:rPr>
-              <a:t>Comp7&gt;</a:t>
-            </a:r>
-          </a:p>
-          <a:p>
-            <a:pPr marL="0" indent="0">
-              <a:buNone/>
-            </a:pPr>
-            <a:r>
-              <a:rPr lang="en-US" altLang="zh-CN" dirty="0" smtClean="0">
-                <a:solidFill>
-                  <a:schemeClr val="accent4">
-                    <a:lumMod val="60000"/>
-                    <a:lumOff val="40000"/>
-                  </a:schemeClr>
-                </a:solidFill>
-                <a:latin typeface="Consolas" panose="020B0609020204030204" pitchFamily="49" charset="0"/>
-              </a:rPr>
-              <a:t>   &lt;/</a:t>
-            </a:r>
-            <a:r>
-              <a:rPr lang="en-US" altLang="zh-CN" dirty="0">
-                <a:solidFill>
-                  <a:schemeClr val="accent4">
-                    <a:lumMod val="60000"/>
-                    <a:lumOff val="40000"/>
-                  </a:schemeClr>
-                </a:solidFill>
-                <a:latin typeface="Consolas" panose="020B0609020204030204" pitchFamily="49" charset="0"/>
-              </a:rPr>
-              <a:t>Comp6&gt;</a:t>
-            </a:r>
-          </a:p>
-          <a:p>
-            <a:pPr marL="0" indent="0">
-              <a:buNone/>
-            </a:pPr>
-            <a:r>
-              <a:rPr lang="en-US" altLang="zh-CN" dirty="0" smtClean="0">
-                <a:solidFill>
-                  <a:schemeClr val="accent4">
-                    <a:lumMod val="60000"/>
-                    <a:lumOff val="40000"/>
-                  </a:schemeClr>
-                </a:solidFill>
-                <a:latin typeface="Consolas" panose="020B0609020204030204" pitchFamily="49" charset="0"/>
-              </a:rPr>
-              <a:t>&lt;/</a:t>
-            </a:r>
-            <a:r>
-              <a:rPr lang="en-US" altLang="zh-CN" dirty="0">
-                <a:solidFill>
-                  <a:schemeClr val="accent4">
-                    <a:lumMod val="60000"/>
-                    <a:lumOff val="40000"/>
-                  </a:schemeClr>
-                </a:solidFill>
-                <a:latin typeface="Consolas" panose="020B0609020204030204" pitchFamily="49" charset="0"/>
-              </a:rPr>
-              <a:t>Comp1&gt;</a:t>
-            </a:r>
-            <a:endParaRPr lang="zh-CN" altLang="en-US" dirty="0">
-              <a:solidFill>
-                <a:schemeClr val="accent4">
-                  <a:lumMod val="60000"/>
-                  <a:lumOff val="40000"/>
-                </a:schemeClr>
-              </a:solidFill>
-              <a:latin typeface="Consolas" panose="020B0609020204030204" pitchFamily="49" charset="0"/>
-            </a:endParaRPr>
-          </a:p>
-        </p:txBody>
-      </p:sp>
-      <p:pic>
-        <p:nvPicPr>
-          <p:cNvPr id="8" name="内容占位符 7"/>
-          <p:cNvPicPr>
-            <a:picLocks noGrp="1" noChangeAspect="1"/>
-          </p:cNvPicPr>
-          <p:nvPr>
-            <p:ph sz="half" idx="2"/>
-          </p:nvPr>
-        </p:nvPicPr>
-        <p:blipFill>
-          <a:blip r:embed="rId2">
-            <a:extLst>
-              <a:ext uri="{28A0092B-C50C-407E-A947-70E740481C1C}">
-                <a14:useLocalDpi xmlns:a14="http://schemas.microsoft.com/office/drawing/2010/main" val="0"/>
-              </a:ext>
-            </a:extLst>
-          </a:blip>
-          <a:stretch>
-            <a:fillRect/>
-          </a:stretch>
-        </p:blipFill>
-        <p:spPr>
-          <a:xfrm>
-            <a:off x="6243637" y="373063"/>
-            <a:ext cx="4875213" cy="1317625"/>
-          </a:xfrm>
-        </p:spPr>
-      </p:pic>
-      <p:sp>
-        <p:nvSpPr>
-          <p:cNvPr id="5" name="文本框 4"/>
-          <p:cNvSpPr txBox="1"/>
-          <p:nvPr/>
-        </p:nvSpPr>
-        <p:spPr>
-          <a:xfrm>
-            <a:off x="6243637" y="1825625"/>
-            <a:ext cx="4875213" cy="892552"/>
-          </a:xfrm>
-          <a:prstGeom prst="rect">
-            <a:avLst/>
-          </a:prstGeom>
-          <a:noFill/>
-        </p:spPr>
-        <p:txBody>
-          <a:bodyPr wrap="square" rtlCol="0">
-            <a:spAutoFit/>
-          </a:bodyPr>
-          <a:lstStyle/>
-          <a:p>
-            <a:r>
-              <a:rPr lang="zh-CN" altLang="en-US" sz="2600" dirty="0" smtClean="0"/>
-              <a:t>如果 </a:t>
-            </a:r>
-            <a:r>
-              <a:rPr lang="en-US" altLang="zh-CN" sz="2600" dirty="0" smtClean="0"/>
-              <a:t>3, 4, 7, 8 </a:t>
-            </a:r>
-            <a:r>
-              <a:rPr lang="zh-CN" altLang="en-US" sz="2600" dirty="0" smtClean="0"/>
-              <a:t>需要用到 </a:t>
-            </a:r>
-            <a:r>
-              <a:rPr lang="en-US" altLang="zh-CN" sz="2600" dirty="0" smtClean="0"/>
-              <a:t>1 </a:t>
-            </a:r>
-            <a:r>
-              <a:rPr lang="zh-CN" altLang="en-US" sz="2600" dirty="0" smtClean="0"/>
-              <a:t>的数据，并且需要修改数据</a:t>
-            </a:r>
-            <a:endParaRPr lang="zh-CN" altLang="en-US" sz="2600" dirty="0"/>
+            <a:endParaRPr lang="en-US" altLang="zh-CN" dirty="0" smtClean="0"/>
+          </a:p>
+          <a:p>
+            <a:r>
+              <a:rPr lang="en-US" altLang="zh-CN" dirty="0" smtClean="0"/>
+              <a:t>2. React </a:t>
+            </a:r>
+            <a:r>
+              <a:rPr lang="zh-CN" altLang="en-US" dirty="0" smtClean="0"/>
+              <a:t>语法简介</a:t>
+            </a:r>
+            <a:endParaRPr lang="en-US" altLang="zh-CN" dirty="0" smtClean="0"/>
+          </a:p>
+          <a:p>
+            <a:endParaRPr lang="en-US" altLang="zh-CN" dirty="0" smtClean="0"/>
+          </a:p>
+          <a:p>
+            <a:r>
+              <a:rPr lang="en-US" altLang="zh-CN" sz="4000" dirty="0">
+                <a:solidFill>
+                  <a:schemeClr val="accent5"/>
+                </a:solidFill>
+              </a:rPr>
+              <a:t>3. </a:t>
+            </a:r>
+            <a:r>
+              <a:rPr lang="zh-CN" altLang="en-US" sz="4000" dirty="0">
+                <a:solidFill>
+                  <a:schemeClr val="accent5"/>
+                </a:solidFill>
+              </a:rPr>
+              <a:t>相关技术</a:t>
+            </a:r>
           </a:p>
         </p:txBody>
       </p:sp>
     </p:spTree>
     <p:extLst>
       <p:ext uri="{BB962C8B-B14F-4D97-AF65-F5344CB8AC3E}">
-        <p14:creationId xmlns:p14="http://schemas.microsoft.com/office/powerpoint/2010/main" val="3782411436"/>
+        <p14:creationId xmlns:p14="http://schemas.microsoft.com/office/powerpoint/2010/main" val="2123684887"/>
       </p:ext>
     </p:extLst>
   </p:cSld>
@@ -9306,6 +8549,374 @@
           </a:p>
         </p:txBody>
       </p:sp>
+      <p:sp>
+        <p:nvSpPr>
+          <p:cNvPr id="6" name="内容占位符 5"/>
+          <p:cNvSpPr>
+            <a:spLocks noGrp="1"/>
+          </p:cNvSpPr>
+          <p:nvPr>
+            <p:ph sz="half" idx="1"/>
+          </p:nvPr>
+        </p:nvSpPr>
+        <p:spPr>
+          <a:xfrm>
+            <a:off x="838200" y="1825625"/>
+            <a:ext cx="5181600" cy="4351338"/>
+          </a:xfrm>
+          <a:solidFill>
+            <a:schemeClr val="tx2"/>
+          </a:solidFill>
+        </p:spPr>
+        <p:txBody>
+          <a:bodyPr>
+            <a:normAutofit lnSpcReduction="10000"/>
+          </a:bodyPr>
+          <a:lstStyle/>
+          <a:p>
+            <a:pPr marL="0" indent="0">
+              <a:buNone/>
+            </a:pPr>
+            <a:r>
+              <a:rPr lang="en-US" altLang="zh-CN" dirty="0">
+                <a:solidFill>
+                  <a:schemeClr val="accent4">
+                    <a:lumMod val="60000"/>
+                    <a:lumOff val="40000"/>
+                  </a:schemeClr>
+                </a:solidFill>
+                <a:latin typeface="Consolas" panose="020B0609020204030204" pitchFamily="49" charset="0"/>
+              </a:rPr>
+              <a:t>&lt;FirstComp&gt;</a:t>
+            </a:r>
+          </a:p>
+          <a:p>
+            <a:pPr marL="0" indent="0">
+              <a:buNone/>
+            </a:pPr>
+            <a:r>
+              <a:rPr lang="en-US" altLang="zh-CN" dirty="0">
+                <a:solidFill>
+                  <a:schemeClr val="accent4">
+                    <a:lumMod val="60000"/>
+                    <a:lumOff val="40000"/>
+                  </a:schemeClr>
+                </a:solidFill>
+                <a:latin typeface="Consolas" panose="020B0609020204030204" pitchFamily="49" charset="0"/>
+              </a:rPr>
+              <a:t>  </a:t>
+            </a:r>
+            <a:r>
+              <a:rPr lang="en-US" altLang="zh-CN" dirty="0" smtClean="0">
+                <a:solidFill>
+                  <a:schemeClr val="accent4">
+                    <a:lumMod val="60000"/>
+                    <a:lumOff val="40000"/>
+                  </a:schemeClr>
+                </a:solidFill>
+                <a:latin typeface="Consolas" panose="020B0609020204030204" pitchFamily="49" charset="0"/>
+              </a:rPr>
+              <a:t>&lt;</a:t>
+            </a:r>
+            <a:r>
+              <a:rPr lang="en-US" altLang="zh-CN" dirty="0">
+                <a:solidFill>
+                  <a:schemeClr val="accent4">
+                    <a:lumMod val="60000"/>
+                    <a:lumOff val="40000"/>
+                  </a:schemeClr>
+                </a:solidFill>
+                <a:latin typeface="Consolas" panose="020B0609020204030204" pitchFamily="49" charset="0"/>
+              </a:rPr>
+              <a:t>SecondComp&gt;</a:t>
+            </a:r>
+          </a:p>
+          <a:p>
+            <a:pPr marL="0" indent="0">
+              <a:buNone/>
+            </a:pPr>
+            <a:r>
+              <a:rPr lang="en-US" altLang="zh-CN" dirty="0">
+                <a:solidFill>
+                  <a:schemeClr val="accent4">
+                    <a:lumMod val="60000"/>
+                    <a:lumOff val="40000"/>
+                  </a:schemeClr>
+                </a:solidFill>
+                <a:latin typeface="Consolas" panose="020B0609020204030204" pitchFamily="49" charset="0"/>
+              </a:rPr>
+              <a:t>    </a:t>
+            </a:r>
+            <a:r>
+              <a:rPr lang="en-US" altLang="zh-CN" dirty="0" smtClean="0">
+                <a:solidFill>
+                  <a:schemeClr val="accent4">
+                    <a:lumMod val="60000"/>
+                    <a:lumOff val="40000"/>
+                  </a:schemeClr>
+                </a:solidFill>
+                <a:latin typeface="Consolas" panose="020B0609020204030204" pitchFamily="49" charset="0"/>
+              </a:rPr>
+              <a:t>&lt;ThirdComp</a:t>
+            </a:r>
+            <a:r>
+              <a:rPr lang="en-US" altLang="zh-CN" dirty="0">
+                <a:solidFill>
+                  <a:schemeClr val="accent4">
+                    <a:lumMod val="60000"/>
+                    <a:lumOff val="40000"/>
+                  </a:schemeClr>
+                </a:solidFill>
+                <a:latin typeface="Consolas" panose="020B0609020204030204" pitchFamily="49" charset="0"/>
+              </a:rPr>
+              <a:t>&gt;</a:t>
+            </a:r>
+          </a:p>
+          <a:p>
+            <a:pPr marL="0" indent="0">
+              <a:buNone/>
+            </a:pPr>
+            <a:r>
+              <a:rPr lang="en-US" altLang="zh-CN" dirty="0">
+                <a:solidFill>
+                  <a:schemeClr val="accent4">
+                    <a:lumMod val="60000"/>
+                    <a:lumOff val="40000"/>
+                  </a:schemeClr>
+                </a:solidFill>
+                <a:latin typeface="Consolas" panose="020B0609020204030204" pitchFamily="49" charset="0"/>
+              </a:rPr>
+              <a:t>      </a:t>
+            </a:r>
+            <a:r>
+              <a:rPr lang="en-US" altLang="zh-CN" dirty="0" smtClean="0">
+                <a:solidFill>
+                  <a:schemeClr val="accent4">
+                    <a:lumMod val="60000"/>
+                    <a:lumOff val="40000"/>
+                  </a:schemeClr>
+                </a:solidFill>
+                <a:latin typeface="Consolas" panose="020B0609020204030204" pitchFamily="49" charset="0"/>
+              </a:rPr>
+              <a:t>&lt;</a:t>
+            </a:r>
+            <a:r>
+              <a:rPr lang="en-US" altLang="zh-CN" dirty="0">
+                <a:solidFill>
+                  <a:schemeClr val="accent4">
+                    <a:lumMod val="60000"/>
+                    <a:lumOff val="40000"/>
+                  </a:schemeClr>
+                </a:solidFill>
+                <a:latin typeface="Consolas" panose="020B0609020204030204" pitchFamily="49" charset="0"/>
+              </a:rPr>
+              <a:t>FourthComp&gt;</a:t>
+            </a:r>
+          </a:p>
+          <a:p>
+            <a:pPr marL="0" indent="0">
+              <a:buNone/>
+            </a:pPr>
+            <a:r>
+              <a:rPr lang="en-US" altLang="zh-CN" dirty="0">
+                <a:solidFill>
+                  <a:schemeClr val="accent4">
+                    <a:lumMod val="60000"/>
+                    <a:lumOff val="40000"/>
+                  </a:schemeClr>
+                </a:solidFill>
+                <a:latin typeface="Consolas" panose="020B0609020204030204" pitchFamily="49" charset="0"/>
+              </a:rPr>
+              <a:t>        </a:t>
+            </a:r>
+            <a:r>
+              <a:rPr lang="en-US" altLang="zh-CN" dirty="0" smtClean="0">
+                <a:solidFill>
+                  <a:schemeClr val="accent4">
+                    <a:lumMod val="60000"/>
+                    <a:lumOff val="40000"/>
+                  </a:schemeClr>
+                </a:solidFill>
+                <a:latin typeface="Consolas" panose="020B0609020204030204" pitchFamily="49" charset="0"/>
+              </a:rPr>
+              <a:t>&lt;</a:t>
+            </a:r>
+            <a:r>
+              <a:rPr lang="en-US" altLang="zh-CN" dirty="0">
+                <a:solidFill>
+                  <a:schemeClr val="accent4">
+                    <a:lumMod val="60000"/>
+                    <a:lumOff val="40000"/>
+                  </a:schemeClr>
+                </a:solidFill>
+                <a:latin typeface="Consolas" panose="020B0609020204030204" pitchFamily="49" charset="0"/>
+              </a:rPr>
+              <a:t>TargetComp /&gt;</a:t>
+            </a:r>
+          </a:p>
+          <a:p>
+            <a:pPr marL="0" indent="0">
+              <a:buNone/>
+            </a:pPr>
+            <a:r>
+              <a:rPr lang="en-US" altLang="zh-CN" dirty="0">
+                <a:solidFill>
+                  <a:schemeClr val="accent4">
+                    <a:lumMod val="60000"/>
+                    <a:lumOff val="40000"/>
+                  </a:schemeClr>
+                </a:solidFill>
+                <a:latin typeface="Consolas" panose="020B0609020204030204" pitchFamily="49" charset="0"/>
+              </a:rPr>
+              <a:t>      </a:t>
+            </a:r>
+            <a:r>
+              <a:rPr lang="en-US" altLang="zh-CN" dirty="0" smtClean="0">
+                <a:solidFill>
+                  <a:schemeClr val="accent4">
+                    <a:lumMod val="60000"/>
+                    <a:lumOff val="40000"/>
+                  </a:schemeClr>
+                </a:solidFill>
+                <a:latin typeface="Consolas" panose="020B0609020204030204" pitchFamily="49" charset="0"/>
+              </a:rPr>
+              <a:t>&lt;/</a:t>
+            </a:r>
+            <a:r>
+              <a:rPr lang="en-US" altLang="zh-CN" dirty="0">
+                <a:solidFill>
+                  <a:schemeClr val="accent4">
+                    <a:lumMod val="60000"/>
+                    <a:lumOff val="40000"/>
+                  </a:schemeClr>
+                </a:solidFill>
+                <a:latin typeface="Consolas" panose="020B0609020204030204" pitchFamily="49" charset="0"/>
+              </a:rPr>
+              <a:t>FourthComp&gt;</a:t>
+            </a:r>
+          </a:p>
+          <a:p>
+            <a:pPr marL="0" indent="0">
+              <a:buNone/>
+            </a:pPr>
+            <a:r>
+              <a:rPr lang="en-US" altLang="zh-CN" dirty="0">
+                <a:solidFill>
+                  <a:schemeClr val="accent4">
+                    <a:lumMod val="60000"/>
+                    <a:lumOff val="40000"/>
+                  </a:schemeClr>
+                </a:solidFill>
+                <a:latin typeface="Consolas" panose="020B0609020204030204" pitchFamily="49" charset="0"/>
+              </a:rPr>
+              <a:t>    </a:t>
+            </a:r>
+            <a:r>
+              <a:rPr lang="en-US" altLang="zh-CN" dirty="0" smtClean="0">
+                <a:solidFill>
+                  <a:schemeClr val="accent4">
+                    <a:lumMod val="60000"/>
+                    <a:lumOff val="40000"/>
+                  </a:schemeClr>
+                </a:solidFill>
+                <a:latin typeface="Consolas" panose="020B0609020204030204" pitchFamily="49" charset="0"/>
+              </a:rPr>
+              <a:t>&lt;/</a:t>
+            </a:r>
+            <a:r>
+              <a:rPr lang="en-US" altLang="zh-CN" dirty="0">
+                <a:solidFill>
+                  <a:schemeClr val="accent4">
+                    <a:lumMod val="60000"/>
+                    <a:lumOff val="40000"/>
+                  </a:schemeClr>
+                </a:solidFill>
+                <a:latin typeface="Consolas" panose="020B0609020204030204" pitchFamily="49" charset="0"/>
+              </a:rPr>
+              <a:t>ThirdComp&gt;</a:t>
+            </a:r>
+          </a:p>
+          <a:p>
+            <a:pPr marL="0" indent="0">
+              <a:buNone/>
+            </a:pPr>
+            <a:r>
+              <a:rPr lang="en-US" altLang="zh-CN" dirty="0">
+                <a:solidFill>
+                  <a:schemeClr val="accent4">
+                    <a:lumMod val="60000"/>
+                    <a:lumOff val="40000"/>
+                  </a:schemeClr>
+                </a:solidFill>
+                <a:latin typeface="Consolas" panose="020B0609020204030204" pitchFamily="49" charset="0"/>
+              </a:rPr>
+              <a:t>  </a:t>
+            </a:r>
+            <a:r>
+              <a:rPr lang="en-US" altLang="zh-CN" dirty="0" smtClean="0">
+                <a:solidFill>
+                  <a:schemeClr val="accent4">
+                    <a:lumMod val="60000"/>
+                    <a:lumOff val="40000"/>
+                  </a:schemeClr>
+                </a:solidFill>
+                <a:latin typeface="Consolas" panose="020B0609020204030204" pitchFamily="49" charset="0"/>
+              </a:rPr>
+              <a:t>&lt;/</a:t>
+            </a:r>
+            <a:r>
+              <a:rPr lang="en-US" altLang="zh-CN" dirty="0">
+                <a:solidFill>
+                  <a:schemeClr val="accent4">
+                    <a:lumMod val="60000"/>
+                    <a:lumOff val="40000"/>
+                  </a:schemeClr>
+                </a:solidFill>
+                <a:latin typeface="Consolas" panose="020B0609020204030204" pitchFamily="49" charset="0"/>
+              </a:rPr>
+              <a:t>SecondComp&gt;</a:t>
+            </a:r>
+          </a:p>
+          <a:p>
+            <a:pPr marL="0" indent="0">
+              <a:buNone/>
+            </a:pPr>
+            <a:r>
+              <a:rPr lang="en-US" altLang="zh-CN" dirty="0" smtClean="0">
+                <a:solidFill>
+                  <a:schemeClr val="accent4">
+                    <a:lumMod val="60000"/>
+                    <a:lumOff val="40000"/>
+                  </a:schemeClr>
+                </a:solidFill>
+                <a:latin typeface="Consolas" panose="020B0609020204030204" pitchFamily="49" charset="0"/>
+              </a:rPr>
+              <a:t>&lt;/</a:t>
+            </a:r>
+            <a:r>
+              <a:rPr lang="en-US" altLang="zh-CN" dirty="0">
+                <a:solidFill>
+                  <a:schemeClr val="accent4">
+                    <a:lumMod val="60000"/>
+                    <a:lumOff val="40000"/>
+                  </a:schemeClr>
+                </a:solidFill>
+                <a:latin typeface="Consolas" panose="020B0609020204030204" pitchFamily="49" charset="0"/>
+              </a:rPr>
+              <a:t>FirstComp&gt;</a:t>
+            </a:r>
+            <a:endParaRPr lang="zh-CN" altLang="en-US" dirty="0">
+              <a:solidFill>
+                <a:schemeClr val="accent4">
+                  <a:lumMod val="60000"/>
+                  <a:lumOff val="40000"/>
+                </a:schemeClr>
+              </a:solidFill>
+              <a:latin typeface="Consolas" panose="020B0609020204030204" pitchFamily="49" charset="0"/>
+            </a:endParaRPr>
+          </a:p>
+        </p:txBody>
+      </p:sp>
       <p:pic>
         <p:nvPicPr>
           <p:cNvPr id="8" name="内容占位符 7"/>
@@ -9337,6 +8948,705 @@
       </p:pic>
       <p:sp>
         <p:nvSpPr>
+          <p:cNvPr id="5" name="文本框 4"/>
+          <p:cNvSpPr txBox="1"/>
+          <p:nvPr/>
+        </p:nvSpPr>
+        <p:spPr>
+          <a:xfrm>
+            <a:off x="6243637" y="1825625"/>
+            <a:ext cx="4875213" cy="2092881"/>
+          </a:xfrm>
+          <a:prstGeom prst="rect">
+            <a:avLst/>
+          </a:prstGeom>
+          <a:noFill/>
+        </p:spPr>
+        <p:txBody>
+          <a:bodyPr wrap="square" rtlCol="0">
+            <a:spAutoFit/>
+          </a:bodyPr>
+          <a:lstStyle/>
+          <a:p>
+            <a:r>
+              <a:rPr lang="zh-CN" altLang="en-US" sz="2600" dirty="0" smtClean="0"/>
+              <a:t>如果 </a:t>
+            </a:r>
+            <a:r>
+              <a:rPr lang="en-US" altLang="zh-CN" sz="2600" dirty="0" smtClean="0"/>
+              <a:t>&lt;TargetComp /&gt; </a:t>
+            </a:r>
+            <a:r>
+              <a:rPr lang="zh-CN" altLang="en-US" sz="2600" dirty="0" smtClean="0"/>
+              <a:t>需要用到一个来自 </a:t>
+            </a:r>
+            <a:r>
+              <a:rPr lang="en-US" altLang="zh-CN" sz="2600" dirty="0" smtClean="0"/>
+              <a:t>&lt;FirstComp /&gt; </a:t>
+            </a:r>
+            <a:r>
+              <a:rPr lang="zh-CN" altLang="en-US" sz="2600" dirty="0" smtClean="0"/>
+              <a:t>的数据，需要以 </a:t>
+            </a:r>
+            <a:r>
+              <a:rPr lang="en-US" altLang="zh-CN" sz="2600" dirty="0" smtClean="0"/>
+              <a:t>props </a:t>
+            </a:r>
+            <a:r>
+              <a:rPr lang="zh-CN" altLang="en-US" sz="2600" dirty="0" smtClean="0"/>
+              <a:t>的方式将该数据传递 </a:t>
+            </a:r>
+            <a:r>
+              <a:rPr lang="en-US" altLang="zh-CN" sz="2600" dirty="0" smtClean="0"/>
+              <a:t>4 </a:t>
+            </a:r>
+            <a:r>
+              <a:rPr lang="zh-CN" altLang="en-US" sz="2600" dirty="0" smtClean="0"/>
+              <a:t>层，然而这个数据对于中间</a:t>
+            </a:r>
+            <a:r>
+              <a:rPr lang="en-US" altLang="zh-CN" sz="2600" dirty="0" smtClean="0"/>
+              <a:t>3 </a:t>
+            </a:r>
+            <a:r>
+              <a:rPr lang="zh-CN" altLang="en-US" sz="2600" dirty="0" smtClean="0"/>
+              <a:t>个组件来说是没有用的</a:t>
+            </a:r>
+            <a:endParaRPr lang="zh-CN" altLang="en-US" sz="2600" dirty="0"/>
+          </a:p>
+        </p:txBody>
+      </p:sp>
+    </p:spTree>
+    <p:extLst>
+      <p:ext uri="{BB962C8B-B14F-4D97-AF65-F5344CB8AC3E}">
+        <p14:creationId xmlns:p14="http://schemas.microsoft.com/office/powerpoint/2010/main" val="1012171988"/>
+      </p:ext>
+    </p:extLst>
+  </p:cSld>
+  <p:clrMapOvr>
+    <a:masterClrMapping/>
+  </p:clrMapOvr>
+  <p:timing>
+    <p:tnLst>
+      <p:par>
+        <p:cTn id="1" dur="indefinite" restart="never" nodeType="tmRoot"/>
+      </p:par>
+    </p:tnLst>
+  </p:timing>
+</p:sld>
+</file>
+
+<file path=ppt/slides/slide22.xml><?xml version="1.0" encoding="utf-8"?>
+<p:sld xmlns:a="http://schemas.openxmlformats.org/drawingml/2006/main" xmlns:r="http://schemas.openxmlformats.org/officeDocument/2006/relationships" xmlns:p="http://schemas.openxmlformats.org/presentationml/2006/main">
+  <p:cSld>
+    <p:spTree>
+      <p:nvGrpSpPr>
+        <p:cNvPr id="1" name=""/>
+        <p:cNvGrpSpPr/>
+        <p:nvPr/>
+      </p:nvGrpSpPr>
+      <p:grpSpPr>
+        <a:xfrm>
+          <a:off x="0" y="0"/>
+          <a:ext cx="0" cy="0"/>
+          <a:chOff x="0" y="0"/>
+          <a:chExt cx="0" cy="0"/>
+        </a:xfrm>
+      </p:grpSpPr>
+      <p:sp>
+        <p:nvSpPr>
+          <p:cNvPr id="2" name="标题 1"/>
+          <p:cNvSpPr>
+            <a:spLocks noGrp="1"/>
+          </p:cNvSpPr>
+          <p:nvPr>
+            <p:ph type="title"/>
+          </p:nvPr>
+        </p:nvSpPr>
+        <p:spPr>
+          <a:xfrm>
+            <a:off x="838200" y="365125"/>
+            <a:ext cx="5181600" cy="1325563"/>
+          </a:xfrm>
+        </p:spPr>
+        <p:txBody>
+          <a:bodyPr/>
+          <a:lstStyle/>
+          <a:p>
+            <a:r>
+              <a:rPr lang="en-US" altLang="zh-CN" dirty="0" smtClean="0"/>
+              <a:t>3.1 Redux </a:t>
+            </a:r>
+            <a:endParaRPr lang="zh-CN" altLang="en-US" dirty="0"/>
+          </a:p>
+        </p:txBody>
+      </p:sp>
+      <p:sp>
+        <p:nvSpPr>
+          <p:cNvPr id="6" name="内容占位符 5"/>
+          <p:cNvSpPr>
+            <a:spLocks noGrp="1"/>
+          </p:cNvSpPr>
+          <p:nvPr>
+            <p:ph sz="half" idx="1"/>
+          </p:nvPr>
+        </p:nvSpPr>
+        <p:spPr>
+          <a:xfrm>
+            <a:off x="838200" y="1825625"/>
+            <a:ext cx="5181600" cy="4351338"/>
+          </a:xfrm>
+          <a:solidFill>
+            <a:schemeClr val="tx2"/>
+          </a:solidFill>
+        </p:spPr>
+        <p:txBody>
+          <a:bodyPr>
+            <a:normAutofit fontScale="77500" lnSpcReduction="20000"/>
+          </a:bodyPr>
+          <a:lstStyle/>
+          <a:p>
+            <a:pPr marL="0" indent="0">
+              <a:buNone/>
+            </a:pPr>
+            <a:r>
+              <a:rPr lang="en-US" altLang="zh-CN" dirty="0" smtClean="0">
+                <a:solidFill>
+                  <a:schemeClr val="accent4">
+                    <a:lumMod val="60000"/>
+                    <a:lumOff val="40000"/>
+                  </a:schemeClr>
+                </a:solidFill>
+                <a:latin typeface="Consolas" panose="020B0609020204030204" pitchFamily="49" charset="0"/>
+              </a:rPr>
+              <a:t>&lt;</a:t>
+            </a:r>
+            <a:r>
+              <a:rPr lang="en-US" altLang="zh-CN" dirty="0">
+                <a:solidFill>
+                  <a:schemeClr val="accent4">
+                    <a:lumMod val="60000"/>
+                    <a:lumOff val="40000"/>
+                  </a:schemeClr>
+                </a:solidFill>
+                <a:latin typeface="Consolas" panose="020B0609020204030204" pitchFamily="49" charset="0"/>
+              </a:rPr>
+              <a:t>Comp1&gt;</a:t>
+            </a:r>
+          </a:p>
+          <a:p>
+            <a:pPr marL="0" indent="0">
+              <a:buNone/>
+            </a:pPr>
+            <a:r>
+              <a:rPr lang="en-US" altLang="zh-CN" dirty="0" smtClean="0">
+                <a:solidFill>
+                  <a:schemeClr val="accent4">
+                    <a:lumMod val="60000"/>
+                    <a:lumOff val="40000"/>
+                  </a:schemeClr>
+                </a:solidFill>
+                <a:latin typeface="Consolas" panose="020B0609020204030204" pitchFamily="49" charset="0"/>
+              </a:rPr>
+              <a:t>  &lt;</a:t>
+            </a:r>
+            <a:r>
+              <a:rPr lang="en-US" altLang="zh-CN" dirty="0">
+                <a:solidFill>
+                  <a:schemeClr val="accent4">
+                    <a:lumMod val="60000"/>
+                    <a:lumOff val="40000"/>
+                  </a:schemeClr>
+                </a:solidFill>
+                <a:latin typeface="Consolas" panose="020B0609020204030204" pitchFamily="49" charset="0"/>
+              </a:rPr>
+              <a:t>Comp2&gt;</a:t>
+            </a:r>
+          </a:p>
+          <a:p>
+            <a:pPr marL="0" indent="0">
+              <a:buNone/>
+            </a:pPr>
+            <a:r>
+              <a:rPr lang="en-US" altLang="zh-CN" dirty="0" smtClean="0">
+                <a:solidFill>
+                  <a:schemeClr val="accent4">
+                    <a:lumMod val="60000"/>
+                    <a:lumOff val="40000"/>
+                  </a:schemeClr>
+                </a:solidFill>
+                <a:latin typeface="Consolas" panose="020B0609020204030204" pitchFamily="49" charset="0"/>
+              </a:rPr>
+              <a:t>    </a:t>
+            </a:r>
+            <a:r>
+              <a:rPr lang="en-US" altLang="zh-CN" dirty="0">
+                <a:solidFill>
+                  <a:schemeClr val="accent6">
+                    <a:lumMod val="60000"/>
+                    <a:lumOff val="40000"/>
+                  </a:schemeClr>
+                </a:solidFill>
+                <a:latin typeface="Consolas" panose="020B0609020204030204" pitchFamily="49" charset="0"/>
+              </a:rPr>
+              <a:t>&lt;Comp3 /&gt;</a:t>
+            </a:r>
+          </a:p>
+          <a:p>
+            <a:pPr marL="0" indent="0">
+              <a:buNone/>
+            </a:pPr>
+            <a:r>
+              <a:rPr lang="en-US" altLang="zh-CN" dirty="0" smtClean="0">
+                <a:solidFill>
+                  <a:schemeClr val="accent4">
+                    <a:lumMod val="60000"/>
+                    <a:lumOff val="40000"/>
+                  </a:schemeClr>
+                </a:solidFill>
+                <a:latin typeface="Consolas" panose="020B0609020204030204" pitchFamily="49" charset="0"/>
+              </a:rPr>
+              <a:t>  &lt;/</a:t>
+            </a:r>
+            <a:r>
+              <a:rPr lang="en-US" altLang="zh-CN" dirty="0">
+                <a:solidFill>
+                  <a:schemeClr val="accent4">
+                    <a:lumMod val="60000"/>
+                    <a:lumOff val="40000"/>
+                  </a:schemeClr>
+                </a:solidFill>
+                <a:latin typeface="Consolas" panose="020B0609020204030204" pitchFamily="49" charset="0"/>
+              </a:rPr>
+              <a:t>Comp2&gt;</a:t>
+            </a:r>
+          </a:p>
+          <a:p>
+            <a:pPr marL="0" indent="0">
+              <a:buNone/>
+            </a:pPr>
+            <a:r>
+              <a:rPr lang="en-US" altLang="zh-CN" dirty="0" smtClean="0">
+                <a:solidFill>
+                  <a:schemeClr val="accent4">
+                    <a:lumMod val="60000"/>
+                    <a:lumOff val="40000"/>
+                  </a:schemeClr>
+                </a:solidFill>
+                <a:latin typeface="Consolas" panose="020B0609020204030204" pitchFamily="49" charset="0"/>
+              </a:rPr>
+              <a:t>  </a:t>
+            </a:r>
+            <a:r>
+              <a:rPr lang="en-US" altLang="zh-CN" dirty="0">
+                <a:solidFill>
+                  <a:schemeClr val="accent6">
+                    <a:lumMod val="60000"/>
+                    <a:lumOff val="40000"/>
+                  </a:schemeClr>
+                </a:solidFill>
+                <a:latin typeface="Consolas" panose="020B0609020204030204" pitchFamily="49" charset="0"/>
+              </a:rPr>
+              <a:t>&lt;Comp4 /&gt;</a:t>
+            </a:r>
+          </a:p>
+          <a:p>
+            <a:pPr marL="0" indent="0">
+              <a:buNone/>
+            </a:pPr>
+            <a:r>
+              <a:rPr lang="en-US" altLang="zh-CN" dirty="0" smtClean="0">
+                <a:solidFill>
+                  <a:schemeClr val="accent4">
+                    <a:lumMod val="60000"/>
+                    <a:lumOff val="40000"/>
+                  </a:schemeClr>
+                </a:solidFill>
+                <a:latin typeface="Consolas" panose="020B0609020204030204" pitchFamily="49" charset="0"/>
+              </a:rPr>
+              <a:t>  </a:t>
+            </a:r>
+            <a:r>
+              <a:rPr lang="en-US" altLang="zh-CN" dirty="0">
+                <a:solidFill>
+                  <a:schemeClr val="accent4">
+                    <a:lumMod val="60000"/>
+                    <a:lumOff val="40000"/>
+                  </a:schemeClr>
+                </a:solidFill>
+                <a:latin typeface="Consolas" panose="020B0609020204030204" pitchFamily="49" charset="0"/>
+              </a:rPr>
+              <a:t>&lt;Comp5 /&gt;</a:t>
+            </a:r>
+          </a:p>
+          <a:p>
+            <a:pPr marL="0" indent="0">
+              <a:buNone/>
+            </a:pPr>
+            <a:r>
+              <a:rPr lang="en-US" altLang="zh-CN" dirty="0" smtClean="0">
+                <a:solidFill>
+                  <a:schemeClr val="accent4">
+                    <a:lumMod val="60000"/>
+                    <a:lumOff val="40000"/>
+                  </a:schemeClr>
+                </a:solidFill>
+                <a:latin typeface="Consolas" panose="020B0609020204030204" pitchFamily="49" charset="0"/>
+              </a:rPr>
+              <a:t>  &lt;</a:t>
+            </a:r>
+            <a:r>
+              <a:rPr lang="en-US" altLang="zh-CN" dirty="0">
+                <a:solidFill>
+                  <a:schemeClr val="accent4">
+                    <a:lumMod val="60000"/>
+                    <a:lumOff val="40000"/>
+                  </a:schemeClr>
+                </a:solidFill>
+                <a:latin typeface="Consolas" panose="020B0609020204030204" pitchFamily="49" charset="0"/>
+              </a:rPr>
+              <a:t>Comp6&gt;</a:t>
+            </a:r>
+          </a:p>
+          <a:p>
+            <a:pPr marL="0" indent="0">
+              <a:buNone/>
+            </a:pPr>
+            <a:r>
+              <a:rPr lang="en-US" altLang="zh-CN" dirty="0" smtClean="0">
+                <a:solidFill>
+                  <a:schemeClr val="accent4">
+                    <a:lumMod val="60000"/>
+                    <a:lumOff val="40000"/>
+                  </a:schemeClr>
+                </a:solidFill>
+                <a:latin typeface="Consolas" panose="020B0609020204030204" pitchFamily="49" charset="0"/>
+              </a:rPr>
+              <a:t>    </a:t>
+            </a:r>
+            <a:r>
+              <a:rPr lang="en-US" altLang="zh-CN" dirty="0">
+                <a:solidFill>
+                  <a:schemeClr val="accent6">
+                    <a:lumMod val="60000"/>
+                    <a:lumOff val="40000"/>
+                  </a:schemeClr>
+                </a:solidFill>
+                <a:latin typeface="Consolas" panose="020B0609020204030204" pitchFamily="49" charset="0"/>
+              </a:rPr>
+              <a:t>&lt;Comp7&gt;</a:t>
+            </a:r>
+          </a:p>
+          <a:p>
+            <a:pPr marL="0" indent="0">
+              <a:buNone/>
+            </a:pPr>
+            <a:r>
+              <a:rPr lang="en-US" altLang="zh-CN" dirty="0" smtClean="0">
+                <a:solidFill>
+                  <a:schemeClr val="accent4">
+                    <a:lumMod val="60000"/>
+                    <a:lumOff val="40000"/>
+                  </a:schemeClr>
+                </a:solidFill>
+                <a:latin typeface="Consolas" panose="020B0609020204030204" pitchFamily="49" charset="0"/>
+              </a:rPr>
+              <a:t>      </a:t>
+            </a:r>
+            <a:r>
+              <a:rPr lang="en-US" altLang="zh-CN" dirty="0">
+                <a:solidFill>
+                  <a:schemeClr val="accent6">
+                    <a:lumMod val="60000"/>
+                    <a:lumOff val="40000"/>
+                  </a:schemeClr>
+                </a:solidFill>
+                <a:latin typeface="Consolas" panose="020B0609020204030204" pitchFamily="49" charset="0"/>
+              </a:rPr>
+              <a:t>&lt;Comp8 /&gt;</a:t>
+            </a:r>
+          </a:p>
+          <a:p>
+            <a:pPr marL="0" indent="0">
+              <a:buNone/>
+            </a:pPr>
+            <a:r>
+              <a:rPr lang="en-US" altLang="zh-CN" dirty="0">
+                <a:solidFill>
+                  <a:schemeClr val="accent4">
+                    <a:lumMod val="60000"/>
+                    <a:lumOff val="40000"/>
+                  </a:schemeClr>
+                </a:solidFill>
+                <a:latin typeface="Consolas" panose="020B0609020204030204" pitchFamily="49" charset="0"/>
+              </a:rPr>
+              <a:t>    </a:t>
+            </a:r>
+            <a:r>
+              <a:rPr lang="en-US" altLang="zh-CN" dirty="0" smtClean="0">
+                <a:solidFill>
+                  <a:schemeClr val="accent4">
+                    <a:lumMod val="60000"/>
+                    <a:lumOff val="40000"/>
+                  </a:schemeClr>
+                </a:solidFill>
+                <a:latin typeface="Consolas" panose="020B0609020204030204" pitchFamily="49" charset="0"/>
+              </a:rPr>
+              <a:t>&lt;/</a:t>
+            </a:r>
+            <a:r>
+              <a:rPr lang="en-US" altLang="zh-CN" dirty="0">
+                <a:solidFill>
+                  <a:schemeClr val="accent4">
+                    <a:lumMod val="60000"/>
+                    <a:lumOff val="40000"/>
+                  </a:schemeClr>
+                </a:solidFill>
+                <a:latin typeface="Consolas" panose="020B0609020204030204" pitchFamily="49" charset="0"/>
+              </a:rPr>
+              <a:t>Comp7&gt;</a:t>
+            </a:r>
+          </a:p>
+          <a:p>
+            <a:pPr marL="0" indent="0">
+              <a:buNone/>
+            </a:pPr>
+            <a:r>
+              <a:rPr lang="en-US" altLang="zh-CN" dirty="0" smtClean="0">
+                <a:solidFill>
+                  <a:schemeClr val="accent4">
+                    <a:lumMod val="60000"/>
+                    <a:lumOff val="40000"/>
+                  </a:schemeClr>
+                </a:solidFill>
+                <a:latin typeface="Consolas" panose="020B0609020204030204" pitchFamily="49" charset="0"/>
+              </a:rPr>
+              <a:t>   &lt;/</a:t>
+            </a:r>
+            <a:r>
+              <a:rPr lang="en-US" altLang="zh-CN" dirty="0">
+                <a:solidFill>
+                  <a:schemeClr val="accent4">
+                    <a:lumMod val="60000"/>
+                    <a:lumOff val="40000"/>
+                  </a:schemeClr>
+                </a:solidFill>
+                <a:latin typeface="Consolas" panose="020B0609020204030204" pitchFamily="49" charset="0"/>
+              </a:rPr>
+              <a:t>Comp6&gt;</a:t>
+            </a:r>
+          </a:p>
+          <a:p>
+            <a:pPr marL="0" indent="0">
+              <a:buNone/>
+            </a:pPr>
+            <a:r>
+              <a:rPr lang="en-US" altLang="zh-CN" dirty="0" smtClean="0">
+                <a:solidFill>
+                  <a:schemeClr val="accent4">
+                    <a:lumMod val="60000"/>
+                    <a:lumOff val="40000"/>
+                  </a:schemeClr>
+                </a:solidFill>
+                <a:latin typeface="Consolas" panose="020B0609020204030204" pitchFamily="49" charset="0"/>
+              </a:rPr>
+              <a:t>&lt;/</a:t>
+            </a:r>
+            <a:r>
+              <a:rPr lang="en-US" altLang="zh-CN" dirty="0">
+                <a:solidFill>
+                  <a:schemeClr val="accent4">
+                    <a:lumMod val="60000"/>
+                    <a:lumOff val="40000"/>
+                  </a:schemeClr>
+                </a:solidFill>
+                <a:latin typeface="Consolas" panose="020B0609020204030204" pitchFamily="49" charset="0"/>
+              </a:rPr>
+              <a:t>Comp1&gt;</a:t>
+            </a:r>
+            <a:endParaRPr lang="zh-CN" altLang="en-US" dirty="0">
+              <a:solidFill>
+                <a:schemeClr val="accent4">
+                  <a:lumMod val="60000"/>
+                  <a:lumOff val="40000"/>
+                </a:schemeClr>
+              </a:solidFill>
+              <a:latin typeface="Consolas" panose="020B0609020204030204" pitchFamily="49" charset="0"/>
+            </a:endParaRPr>
+          </a:p>
+        </p:txBody>
+      </p:sp>
+      <p:pic>
+        <p:nvPicPr>
+          <p:cNvPr id="8" name="内容占位符 7"/>
+          <p:cNvPicPr>
+            <a:picLocks noGrp="1" noChangeAspect="1"/>
+          </p:cNvPicPr>
+          <p:nvPr>
+            <p:ph sz="half" idx="2"/>
+          </p:nvPr>
+        </p:nvPicPr>
+        <p:blipFill>
+          <a:blip r:embed="rId2">
+            <a:extLst>
+              <a:ext uri="{28A0092B-C50C-407E-A947-70E740481C1C}">
+                <a14:useLocalDpi xmlns:a14="http://schemas.microsoft.com/office/drawing/2010/main" val="0"/>
+              </a:ext>
+            </a:extLst>
+          </a:blip>
+          <a:stretch>
+            <a:fillRect/>
+          </a:stretch>
+        </p:blipFill>
+        <p:spPr>
+          <a:xfrm>
+            <a:off x="6243637" y="373063"/>
+            <a:ext cx="4875213" cy="1317625"/>
+          </a:xfrm>
+        </p:spPr>
+      </p:pic>
+      <p:sp>
+        <p:nvSpPr>
+          <p:cNvPr id="5" name="文本框 4"/>
+          <p:cNvSpPr txBox="1"/>
+          <p:nvPr/>
+        </p:nvSpPr>
+        <p:spPr>
+          <a:xfrm>
+            <a:off x="6243637" y="1825625"/>
+            <a:ext cx="4875213" cy="892552"/>
+          </a:xfrm>
+          <a:prstGeom prst="rect">
+            <a:avLst/>
+          </a:prstGeom>
+          <a:noFill/>
+        </p:spPr>
+        <p:txBody>
+          <a:bodyPr wrap="square" rtlCol="0">
+            <a:spAutoFit/>
+          </a:bodyPr>
+          <a:lstStyle/>
+          <a:p>
+            <a:r>
+              <a:rPr lang="zh-CN" altLang="en-US" sz="2600" dirty="0" smtClean="0"/>
+              <a:t>如果 </a:t>
+            </a:r>
+            <a:r>
+              <a:rPr lang="en-US" altLang="zh-CN" sz="2600" dirty="0" smtClean="0"/>
+              <a:t>3, 4, 7, 8 </a:t>
+            </a:r>
+            <a:r>
+              <a:rPr lang="zh-CN" altLang="en-US" sz="2600" dirty="0" smtClean="0"/>
+              <a:t>需要用到 </a:t>
+            </a:r>
+            <a:r>
+              <a:rPr lang="en-US" altLang="zh-CN" sz="2600" dirty="0" smtClean="0"/>
+              <a:t>1 </a:t>
+            </a:r>
+            <a:r>
+              <a:rPr lang="zh-CN" altLang="en-US" sz="2600" dirty="0" smtClean="0"/>
+              <a:t>的数据，并且需要修改数据</a:t>
+            </a:r>
+            <a:endParaRPr lang="zh-CN" altLang="en-US" sz="2600" dirty="0"/>
+          </a:p>
+        </p:txBody>
+      </p:sp>
+    </p:spTree>
+    <p:extLst>
+      <p:ext uri="{BB962C8B-B14F-4D97-AF65-F5344CB8AC3E}">
+        <p14:creationId xmlns:p14="http://schemas.microsoft.com/office/powerpoint/2010/main" val="3782411436"/>
+      </p:ext>
+    </p:extLst>
+  </p:cSld>
+  <p:clrMapOvr>
+    <a:masterClrMapping/>
+  </p:clrMapOvr>
+  <p:timing>
+    <p:tnLst>
+      <p:par>
+        <p:cTn id="1" dur="indefinite" restart="never" nodeType="tmRoot"/>
+      </p:par>
+    </p:tnLst>
+  </p:timing>
+</p:sld>
+</file>
+
+<file path=ppt/slides/slide23.xml><?xml version="1.0" encoding="utf-8"?>
+<p:sld xmlns:a="http://schemas.openxmlformats.org/drawingml/2006/main" xmlns:r="http://schemas.openxmlformats.org/officeDocument/2006/relationships" xmlns:p="http://schemas.openxmlformats.org/presentationml/2006/main">
+  <p:cSld>
+    <p:spTree>
+      <p:nvGrpSpPr>
+        <p:cNvPr id="1" name=""/>
+        <p:cNvGrpSpPr/>
+        <p:nvPr/>
+      </p:nvGrpSpPr>
+      <p:grpSpPr>
+        <a:xfrm>
+          <a:off x="0" y="0"/>
+          <a:ext cx="0" cy="0"/>
+          <a:chOff x="0" y="0"/>
+          <a:chExt cx="0" cy="0"/>
+        </a:xfrm>
+      </p:grpSpPr>
+      <p:sp>
+        <p:nvSpPr>
+          <p:cNvPr id="2" name="标题 1"/>
+          <p:cNvSpPr>
+            <a:spLocks noGrp="1"/>
+          </p:cNvSpPr>
+          <p:nvPr>
+            <p:ph type="title"/>
+          </p:nvPr>
+        </p:nvSpPr>
+        <p:spPr>
+          <a:xfrm>
+            <a:off x="838200" y="365125"/>
+            <a:ext cx="5181600" cy="1325563"/>
+          </a:xfrm>
+        </p:spPr>
+        <p:txBody>
+          <a:bodyPr/>
+          <a:lstStyle/>
+          <a:p>
+            <a:r>
+              <a:rPr lang="en-US" altLang="zh-CN" dirty="0" smtClean="0"/>
+              <a:t>3.1 Redux </a:t>
+            </a:r>
+            <a:endParaRPr lang="zh-CN" altLang="en-US" dirty="0"/>
+          </a:p>
+        </p:txBody>
+      </p:sp>
+      <p:pic>
+        <p:nvPicPr>
+          <p:cNvPr id="8" name="内容占位符 7"/>
+          <p:cNvPicPr>
+            <a:picLocks noGrp="1" noChangeAspect="1"/>
+          </p:cNvPicPr>
+          <p:nvPr>
+            <p:ph sz="half" idx="2"/>
+          </p:nvPr>
+        </p:nvPicPr>
+        <p:blipFill>
+          <a:blip r:embed="rId2">
+            <a:extLst>
+              <a:ext uri="{28A0092B-C50C-407E-A947-70E740481C1C}">
+                <a14:useLocalDpi xmlns:a14="http://schemas.microsoft.com/office/drawing/2010/main" val="0"/>
+              </a:ext>
+            </a:extLst>
+          </a:blip>
+          <a:stretch>
+            <a:fillRect/>
+          </a:stretch>
+        </p:blipFill>
+        <p:spPr>
+          <a:xfrm>
+            <a:off x="6243637" y="373063"/>
+            <a:ext cx="4875213" cy="1317625"/>
+          </a:xfrm>
+        </p:spPr>
+      </p:pic>
+      <p:sp>
+        <p:nvSpPr>
           <p:cNvPr id="4" name="内容占位符 3"/>
           <p:cNvSpPr>
             <a:spLocks noGrp="1"/>
@@ -9446,7 +9756,7 @@
 </p:sld>
 </file>
 
-<file path=ppt/slides/slide22.xml><?xml version="1.0" encoding="utf-8"?>
+<file path=ppt/slides/slide24.xml><?xml version="1.0" encoding="utf-8"?>
 <p:sld xmlns:a="http://schemas.openxmlformats.org/drawingml/2006/main" xmlns:r="http://schemas.openxmlformats.org/officeDocument/2006/relationships" xmlns:p="http://schemas.openxmlformats.org/presentationml/2006/main">
   <p:cSld>
     <p:spTree>
@@ -9566,7 +9876,7 @@
 </p:sld>
 </file>
 
-<file path=ppt/slides/slide23.xml><?xml version="1.0" encoding="utf-8"?>
+<file path=ppt/slides/slide25.xml><?xml version="1.0" encoding="utf-8"?>
 <p:sld xmlns:a="http://schemas.openxmlformats.org/drawingml/2006/main" xmlns:r="http://schemas.openxmlformats.org/officeDocument/2006/relationships" xmlns:p="http://schemas.openxmlformats.org/presentationml/2006/main">
   <p:cSld>
     <p:spTree>
@@ -9732,7 +10042,7 @@
 </p:sld>
 </file>
 
-<file path=ppt/slides/slide24.xml><?xml version="1.0" encoding="utf-8"?>
+<file path=ppt/slides/slide26.xml><?xml version="1.0" encoding="utf-8"?>
 <p:sld xmlns:a="http://schemas.openxmlformats.org/drawingml/2006/main" xmlns:r="http://schemas.openxmlformats.org/officeDocument/2006/relationships" xmlns:p="http://schemas.openxmlformats.org/presentationml/2006/main">
   <p:cSld>
     <p:spTree>
@@ -9914,7 +10224,7 @@
 </p:sld>
 </file>
 
-<file path=ppt/slides/slide25.xml><?xml version="1.0" encoding="utf-8"?>
+<file path=ppt/slides/slide27.xml><?xml version="1.0" encoding="utf-8"?>
 <p:sld xmlns:a="http://schemas.openxmlformats.org/drawingml/2006/main" xmlns:r="http://schemas.openxmlformats.org/officeDocument/2006/relationships" xmlns:p="http://schemas.openxmlformats.org/presentationml/2006/main">
   <p:cSld>
     <p:spTree>
@@ -10157,7 +10467,7 @@
 </p:sld>
 </file>
 
-<file path=ppt/slides/slide26.xml><?xml version="1.0" encoding="utf-8"?>
+<file path=ppt/slides/slide28.xml><?xml version="1.0" encoding="utf-8"?>
 <p:sld xmlns:a="http://schemas.openxmlformats.org/drawingml/2006/main" xmlns:r="http://schemas.openxmlformats.org/officeDocument/2006/relationships" xmlns:p="http://schemas.openxmlformats.org/presentationml/2006/main">
   <p:cSld>
     <p:spTree>
@@ -10176,12 +10486,12 @@
       </p:grpSpPr>
       <p:sp>
         <p:nvSpPr>
-          <p:cNvPr id="2" name="标题 1"/>
-          <p:cNvSpPr>
-            <a:spLocks noGrp="1"/>
-          </p:cNvSpPr>
-          <p:nvPr>
-            <p:ph type="title"/>
+          <p:cNvPr id="5" name="标题 4"/>
+          <p:cNvSpPr>
+            <a:spLocks noGrp="1"/>
+          </p:cNvSpPr>
+          <p:nvPr>
+            <p:ph type="ctrTitle"/>
           </p:nvPr>
         </p:nvSpPr>
         <p:spPr/>
@@ -10189,37 +10499,22 @@
           <a:bodyPr/>
           <a:lstStyle/>
           <a:p>
-            <a:endParaRPr lang="zh-CN" altLang="en-US"/>
-          </a:p>
-        </p:txBody>
-      </p:sp>
-      <p:sp>
-        <p:nvSpPr>
-          <p:cNvPr id="3" name="内容占位符 2"/>
-          <p:cNvSpPr>
-            <a:spLocks noGrp="1"/>
-          </p:cNvSpPr>
-          <p:nvPr>
-            <p:ph sz="half" idx="1"/>
-          </p:nvPr>
-        </p:nvSpPr>
-        <p:spPr/>
-        <p:txBody>
-          <a:bodyPr/>
-          <a:lstStyle/>
-          <a:p>
-            <a:endParaRPr lang="zh-CN" altLang="en-US"/>
-          </a:p>
-        </p:txBody>
-      </p:sp>
-      <p:sp>
-        <p:nvSpPr>
-          <p:cNvPr id="4" name="内容占位符 3"/>
-          <p:cNvSpPr>
-            <a:spLocks noGrp="1"/>
-          </p:cNvSpPr>
-          <p:nvPr>
-            <p:ph sz="half" idx="2"/>
+            <a:r>
+              <a:rPr lang="en-US" altLang="zh-CN" dirty="0" smtClean="0"/>
+              <a:t>Thanks!</a:t>
+            </a:r>
+            <a:endParaRPr lang="zh-CN" altLang="en-US" dirty="0"/>
+          </a:p>
+        </p:txBody>
+      </p:sp>
+      <p:sp>
+        <p:nvSpPr>
+          <p:cNvPr id="6" name="副标题 5"/>
+          <p:cNvSpPr>
+            <a:spLocks noGrp="1"/>
+          </p:cNvSpPr>
+          <p:nvPr>
+            <p:ph type="subTitle" idx="1"/>
           </p:nvPr>
         </p:nvSpPr>
         <p:spPr/>
@@ -10241,6 +10536,13 @@
   <p:clrMapOvr>
     <a:masterClrMapping/>
   </p:clrMapOvr>
+  <p:timing>
+    <p:tnLst>
+      <p:par>
+        <p:cTn id="1" dur="indefinite" restart="never" nodeType="tmRoot"/>
+      </p:par>
+    </p:tnLst>
+  </p:timing>
 </p:sld>
 </file>
 

</xml_diff>